<commit_message>
Requirements module resources updated. Detailed exercise statement added in ppt and mlx formats.
</commit_message>
<xml_diff>
--- a/2. Requirements/2.2 Writing requirements.pptx
+++ b/2. Requirements/2.2 Writing requirements.pptx
@@ -11,13 +11,13 @@
     <p:handoutMasterId r:id="rId25"/>
   </p:handoutMasterIdLst>
   <p:sldIdLst>
-    <p:sldId id="257" r:id="rId2"/>
-    <p:sldId id="491" r:id="rId3"/>
+    <p:sldId id="492" r:id="rId2"/>
+    <p:sldId id="494" r:id="rId3"/>
     <p:sldId id="460" r:id="rId4"/>
-    <p:sldId id="464" r:id="rId5"/>
-    <p:sldId id="475" r:id="rId6"/>
-    <p:sldId id="478" r:id="rId7"/>
-    <p:sldId id="471" r:id="rId8"/>
+    <p:sldId id="495" r:id="rId5"/>
+    <p:sldId id="496" r:id="rId6"/>
+    <p:sldId id="498" r:id="rId7"/>
+    <p:sldId id="499" r:id="rId8"/>
     <p:sldId id="470" r:id="rId9"/>
     <p:sldId id="479" r:id="rId10"/>
     <p:sldId id="480" r:id="rId11"/>
@@ -31,7 +31,7 @@
     <p:sldId id="489" r:id="rId19"/>
     <p:sldId id="487" r:id="rId20"/>
     <p:sldId id="476" r:id="rId21"/>
-    <p:sldId id="477" r:id="rId22"/>
+    <p:sldId id="497" r:id="rId22"/>
     <p:sldId id="319" r:id="rId23"/>
   </p:sldIdLst>
   <p:sldSz cx="9144000" cy="6858000" type="screen4x3"/>
@@ -4619,7 +4619,7 @@
           <a:p>
             <a:fld id="{DE2F9ED7-D9DF-9B4A-A1AC-9FBF0C9B1C8E}" type="datetime1">
               <a:rPr lang="es-ES" smtClean="0"/>
-              <a:t>02/01/2023</a:t>
+              <a:t>14/02/2023</a:t>
             </a:fld>
             <a:endParaRPr lang="en-US"/>
           </a:p>
@@ -4789,7 +4789,7 @@
           <a:p>
             <a:fld id="{FEDC53B6-CB23-B545-A702-0812837A95EA}" type="datetime1">
               <a:rPr lang="es-ES" smtClean="0"/>
-              <a:t>02/01/2023</a:t>
+              <a:t>14/02/2023</a:t>
             </a:fld>
             <a:endParaRPr lang="en-US"/>
           </a:p>
@@ -6066,7 +6066,7 @@
             <a:fld id="{2D72A43D-7419-4C41-A920-C6E38643746D}" type="datetime3">
               <a:rPr lang="es-ES_tradnl" smtClean="0"/>
               <a:pPr/>
-              <a:t>02.01.23</a:t>
+              <a:t>14.02.23</a:t>
             </a:fld>
             <a:endParaRPr lang="en-US" dirty="0"/>
           </a:p>
@@ -6101,10 +6101,9 @@
           </a:lstStyle>
           <a:p>
             <a:r>
-              <a:rPr lang="en-US"/>
-              <a:t>Mondragon Unibertsitatea</a:t>
-            </a:r>
-            <a:endParaRPr lang="en-US" dirty="0"/>
+              <a:rPr lang="en-US" dirty="0"/>
+              <a:t>Writing requirements</a:t>
+            </a:r>
           </a:p>
         </p:txBody>
       </p:sp>
@@ -6328,7 +6327,7 @@
             <a:fld id="{2D72A43D-7419-4C41-A920-C6E38643746D}" type="datetime3">
               <a:rPr lang="es-ES_tradnl" smtClean="0"/>
               <a:pPr/>
-              <a:t>02.01.23</a:t>
+              <a:t>14.02.23</a:t>
             </a:fld>
             <a:endParaRPr lang="en-US" dirty="0"/>
           </a:p>
@@ -6363,10 +6362,9 @@
           </a:lstStyle>
           <a:p>
             <a:r>
-              <a:rPr lang="en-US"/>
-              <a:t>Mondragon Unibertsitatea</a:t>
-            </a:r>
-            <a:endParaRPr lang="en-US" dirty="0"/>
+              <a:rPr lang="en-US" dirty="0"/>
+              <a:t>Writing requirements</a:t>
+            </a:r>
           </a:p>
         </p:txBody>
       </p:sp>
@@ -6627,7 +6625,7 @@
           <a:p>
             <a:fld id="{0051B10C-2937-EF49-B2B2-FDE1E3A46A2D}" type="datetime3">
               <a:rPr lang="es-ES_tradnl" smtClean="0"/>
-              <a:t>02.01.23</a:t>
+              <a:t>14.02.23</a:t>
             </a:fld>
             <a:endParaRPr lang="en-US" dirty="0"/>
           </a:p>
@@ -6902,7 +6900,7 @@
           <a:p>
             <a:fld id="{0051B10C-2937-EF49-B2B2-FDE1E3A46A2D}" type="datetime3">
               <a:rPr lang="es-ES_tradnl" smtClean="0"/>
-              <a:t>02.01.23</a:t>
+              <a:t>14.02.23</a:t>
             </a:fld>
             <a:endParaRPr lang="en-US" dirty="0"/>
           </a:p>
@@ -6937,10 +6935,9 @@
           </a:lstStyle>
           <a:p>
             <a:r>
-              <a:rPr lang="en-US"/>
-              <a:t>Mondragon Unibertsitatea</a:t>
-            </a:r>
-            <a:endParaRPr lang="en-US" dirty="0"/>
+              <a:rPr lang="en-US" dirty="0"/>
+              <a:t>Writing requirements</a:t>
+            </a:r>
           </a:p>
         </p:txBody>
       </p:sp>
@@ -7207,7 +7204,7 @@
           <a:p>
             <a:fld id="{0051B10C-2937-EF49-B2B2-FDE1E3A46A2D}" type="datetime3">
               <a:rPr lang="es-ES_tradnl" smtClean="0"/>
-              <a:t>02.01.23</a:t>
+              <a:t>14.02.23</a:t>
             </a:fld>
             <a:endParaRPr lang="en-US" dirty="0"/>
           </a:p>
@@ -7242,10 +7239,9 @@
           </a:lstStyle>
           <a:p>
             <a:r>
-              <a:rPr lang="en-US"/>
-              <a:t>Mondragon Unibertsitatea</a:t>
-            </a:r>
-            <a:endParaRPr lang="en-US" dirty="0"/>
+              <a:rPr lang="en-US" dirty="0"/>
+              <a:t>Writing requirements</a:t>
+            </a:r>
           </a:p>
         </p:txBody>
       </p:sp>
@@ -7517,7 +7513,7 @@
           <a:p>
             <a:fld id="{2DCE5B6F-4229-BD47-9F49-CE071C120013}" type="datetime3">
               <a:rPr lang="es-ES_tradnl" smtClean="0"/>
-              <a:t>02.01.23</a:t>
+              <a:t>14.02.23</a:t>
             </a:fld>
             <a:endParaRPr lang="en-US" dirty="0"/>
           </a:p>
@@ -7552,10 +7548,9 @@
           </a:lstStyle>
           <a:p>
             <a:r>
-              <a:rPr lang="en-US"/>
-              <a:t>Mondragon Unibertsitatea</a:t>
-            </a:r>
-            <a:endParaRPr lang="en-US" dirty="0"/>
+              <a:rPr lang="en-US" dirty="0"/>
+              <a:t>Writing requirements</a:t>
+            </a:r>
           </a:p>
         </p:txBody>
       </p:sp>
@@ -7845,7 +7840,7 @@
           <a:p>
             <a:fld id="{2DCE5B6F-4229-BD47-9F49-CE071C120013}" type="datetime3">
               <a:rPr lang="es-ES_tradnl" smtClean="0"/>
-              <a:t>02.01.23</a:t>
+              <a:t>14.02.23</a:t>
             </a:fld>
             <a:endParaRPr lang="en-US" dirty="0"/>
           </a:p>
@@ -7880,10 +7875,9 @@
           </a:lstStyle>
           <a:p>
             <a:r>
-              <a:rPr lang="en-US"/>
-              <a:t>Mondragon Unibertsitatea</a:t>
-            </a:r>
-            <a:endParaRPr lang="en-US" dirty="0"/>
+              <a:rPr lang="en-US" dirty="0"/>
+              <a:t>Writing requirements</a:t>
+            </a:r>
           </a:p>
         </p:txBody>
       </p:sp>
@@ -8173,7 +8167,7 @@
           <a:p>
             <a:fld id="{2DCE5B6F-4229-BD47-9F49-CE071C120013}" type="datetime3">
               <a:rPr lang="es-ES_tradnl" smtClean="0"/>
-              <a:t>02.01.23</a:t>
+              <a:t>14.02.23</a:t>
             </a:fld>
             <a:endParaRPr lang="en-US" dirty="0"/>
           </a:p>
@@ -8611,7 +8605,7 @@
             <a:fld id="{6D8C46FE-6D60-7E43-9EAD-3064B98E9FE4}" type="datetime3">
               <a:rPr lang="es-ES_tradnl" smtClean="0"/>
               <a:pPr/>
-              <a:t>02.01.23</a:t>
+              <a:t>14.02.23</a:t>
             </a:fld>
             <a:endParaRPr lang="en-US" dirty="0"/>
           </a:p>
@@ -8646,10 +8640,9 @@
           </a:lstStyle>
           <a:p>
             <a:r>
-              <a:rPr lang="en-US"/>
-              <a:t>Mondragon Unibertsitatea</a:t>
-            </a:r>
-            <a:endParaRPr lang="en-US" dirty="0"/>
+              <a:rPr lang="en-US" dirty="0"/>
+              <a:t>Writing requirements</a:t>
+            </a:r>
           </a:p>
         </p:txBody>
       </p:sp>
@@ -9034,7 +9027,7 @@
             <a:fld id="{6D8C46FE-6D60-7E43-9EAD-3064B98E9FE4}" type="datetime3">
               <a:rPr lang="es-ES_tradnl" smtClean="0"/>
               <a:pPr/>
-              <a:t>02.01.23</a:t>
+              <a:t>14.02.23</a:t>
             </a:fld>
             <a:endParaRPr lang="en-US" dirty="0"/>
           </a:p>
@@ -9069,10 +9062,9 @@
           </a:lstStyle>
           <a:p>
             <a:r>
-              <a:rPr lang="en-US"/>
-              <a:t>Mondragon Unibertsitatea</a:t>
-            </a:r>
-            <a:endParaRPr lang="en-US" dirty="0"/>
+              <a:rPr lang="en-US" dirty="0"/>
+              <a:t>Writing requirements</a:t>
+            </a:r>
           </a:p>
         </p:txBody>
       </p:sp>
@@ -9771,7 +9763,7 @@
             <a:fld id="{6D8C46FE-6D60-7E43-9EAD-3064B98E9FE4}" type="datetime3">
               <a:rPr lang="es-ES_tradnl" smtClean="0"/>
               <a:pPr/>
-              <a:t>02.01.23</a:t>
+              <a:t>14.02.23</a:t>
             </a:fld>
             <a:endParaRPr lang="en-US" dirty="0"/>
           </a:p>
@@ -9806,10 +9798,9 @@
           </a:lstStyle>
           <a:p>
             <a:r>
-              <a:rPr lang="en-US"/>
-              <a:t>Mondragon Unibertsitatea</a:t>
-            </a:r>
-            <a:endParaRPr lang="en-US" dirty="0"/>
+              <a:rPr lang="en-US" dirty="0"/>
+              <a:t>Writing requirements</a:t>
+            </a:r>
           </a:p>
         </p:txBody>
       </p:sp>
@@ -10087,7 +10078,7 @@
             <a:fld id="{03BAEA45-06BF-1B4B-8B5F-15A64A07D060}" type="datetime3">
               <a:rPr lang="es-ES_tradnl" smtClean="0"/>
               <a:pPr/>
-              <a:t>02.01.23</a:t>
+              <a:t>14.02.23</a:t>
             </a:fld>
             <a:endParaRPr lang="en-US" dirty="0"/>
           </a:p>
@@ -10122,10 +10113,9 @@
           </a:lstStyle>
           <a:p>
             <a:r>
-              <a:rPr lang="en-US"/>
-              <a:t>Mondragon Unibertsitatea</a:t>
-            </a:r>
-            <a:endParaRPr lang="en-US" dirty="0"/>
+              <a:rPr lang="en-US" dirty="0"/>
+              <a:t>Writing requirements</a:t>
+            </a:r>
           </a:p>
         </p:txBody>
       </p:sp>
@@ -10286,7 +10276,7 @@
             <a:fld id="{03BAEA45-06BF-1B4B-8B5F-15A64A07D060}" type="datetime3">
               <a:rPr lang="es-ES_tradnl" smtClean="0"/>
               <a:pPr/>
-              <a:t>02.01.23</a:t>
+              <a:t>14.02.23</a:t>
             </a:fld>
             <a:endParaRPr lang="en-US" dirty="0"/>
           </a:p>
@@ -10321,10 +10311,9 @@
           </a:lstStyle>
           <a:p>
             <a:r>
-              <a:rPr lang="en-US"/>
-              <a:t>Mondragon Unibertsitatea</a:t>
-            </a:r>
-            <a:endParaRPr lang="en-US" dirty="0"/>
+              <a:rPr lang="en-US" dirty="0"/>
+              <a:t>Writing requirements</a:t>
+            </a:r>
           </a:p>
         </p:txBody>
       </p:sp>
@@ -10485,7 +10474,7 @@
             <a:fld id="{03BAEA45-06BF-1B4B-8B5F-15A64A07D060}" type="datetime3">
               <a:rPr lang="es-ES_tradnl" smtClean="0"/>
               <a:pPr/>
-              <a:t>02.01.23</a:t>
+              <a:t>14.02.23</a:t>
             </a:fld>
             <a:endParaRPr lang="en-US" dirty="0"/>
           </a:p>
@@ -10520,10 +10509,9 @@
           </a:lstStyle>
           <a:p>
             <a:r>
-              <a:rPr lang="en-US"/>
-              <a:t>Mondragon Unibertsitatea</a:t>
-            </a:r>
-            <a:endParaRPr lang="en-US" dirty="0"/>
+              <a:rPr lang="en-US" dirty="0"/>
+              <a:t>Writing requirements</a:t>
+            </a:r>
           </a:p>
         </p:txBody>
       </p:sp>
@@ -14075,7 +14063,7 @@
             <a:fld id="{2D72A43D-7419-4C41-A920-C6E38643746D}" type="datetime3">
               <a:rPr lang="es-ES_tradnl" smtClean="0"/>
               <a:pPr/>
-              <a:t>02.01.23</a:t>
+              <a:t>14.02.23</a:t>
             </a:fld>
             <a:endParaRPr lang="en-US" dirty="0"/>
           </a:p>
@@ -14110,10 +14098,9 @@
           </a:lstStyle>
           <a:p>
             <a:r>
-              <a:rPr lang="en-US"/>
-              <a:t>Mondragon Unibertsitatea</a:t>
-            </a:r>
-            <a:endParaRPr lang="en-US" dirty="0"/>
+              <a:rPr lang="en-US" dirty="0"/>
+              <a:t>Writing requirements</a:t>
+            </a:r>
           </a:p>
         </p:txBody>
       </p:sp>
@@ -14356,7 +14343,7 @@
           <a:p>
             <a:fld id="{9FAE4B82-6DFA-A543-B435-4398A9590E55}" type="datetime3">
               <a:rPr lang="es-ES_tradnl" smtClean="0"/>
-              <a:t>02.01.23</a:t>
+              <a:t>14.02.23</a:t>
             </a:fld>
             <a:endParaRPr lang="en-US" dirty="0"/>
           </a:p>
@@ -14397,10 +14384,9 @@
           </a:lstStyle>
           <a:p>
             <a:r>
-              <a:rPr lang="en-US"/>
-              <a:t>Mondragon Unibertsitatea</a:t>
-            </a:r>
-            <a:endParaRPr lang="en-US" dirty="0"/>
+              <a:rPr lang="en-US" dirty="0"/>
+              <a:t>Writing requirements</a:t>
+            </a:r>
           </a:p>
         </p:txBody>
       </p:sp>
@@ -14883,7 +14869,13 @@
       </p:grpSpPr>
       <p:sp>
         <p:nvSpPr>
-          <p:cNvPr id="21" name="Title 20"/>
+          <p:cNvPr id="2" name="Título 1">
+            <a:extLst>
+              <a:ext uri="{FF2B5EF4-FFF2-40B4-BE49-F238E27FC236}">
+                <a16:creationId xmlns:a16="http://schemas.microsoft.com/office/drawing/2014/main" id="{4EF8645D-5E07-414A-8015-438F312ED117}"/>
+              </a:ext>
+            </a:extLst>
+          </p:cNvPr>
           <p:cNvSpPr>
             <a:spLocks noGrp="1"/>
           </p:cNvSpPr>
@@ -14893,29 +14885,34 @@
         </p:nvSpPr>
         <p:spPr/>
         <p:txBody>
-          <a:bodyPr>
-            <a:normAutofit/>
-          </a:bodyPr>
+          <a:bodyPr/>
           <a:lstStyle/>
           <a:p>
             <a:r>
-              <a:rPr lang="en-US" dirty="0"/>
+              <a:rPr lang="es-ES" dirty="0" err="1"/>
               <a:t>Writing</a:t>
             </a:r>
-            <a:br>
-              <a:rPr lang="en-US" dirty="0"/>
-            </a:br>
-            <a:r>
-              <a:rPr lang="en-US" dirty="0"/>
+            <a:r>
+              <a:rPr lang="es-ES" dirty="0"/>
+              <a:t> </a:t>
+            </a:r>
+            <a:r>
+              <a:rPr lang="es-ES" dirty="0" err="1"/>
               <a:t>requirements</a:t>
             </a:r>
-            <a:endParaRPr lang="en-US" sz="1800" dirty="0"/>
-          </a:p>
-        </p:txBody>
-      </p:sp>
-      <p:sp>
-        <p:nvSpPr>
-          <p:cNvPr id="2" name="Text Placeholder 1"/>
+            <a:endParaRPr lang="es-ES" dirty="0"/>
+          </a:p>
+        </p:txBody>
+      </p:sp>
+      <p:sp>
+        <p:nvSpPr>
+          <p:cNvPr id="3" name="Marcador de texto 2">
+            <a:extLst>
+              <a:ext uri="{FF2B5EF4-FFF2-40B4-BE49-F238E27FC236}">
+                <a16:creationId xmlns:a16="http://schemas.microsoft.com/office/drawing/2014/main" id="{D34D36AD-DDFC-40E6-8116-B66AFE899284}"/>
+              </a:ext>
+            </a:extLst>
+          </p:cNvPr>
           <p:cNvSpPr>
             <a:spLocks noGrp="1"/>
           </p:cNvSpPr>
@@ -14928,78 +14925,53 @@
           <a:bodyPr/>
           <a:lstStyle/>
           <a:p>
-            <a:endParaRPr lang="en-US" dirty="0"/>
-          </a:p>
-          <a:p>
-            <a:endParaRPr lang="en-US" dirty="0"/>
-          </a:p>
-        </p:txBody>
-      </p:sp>
-      <p:sp>
-        <p:nvSpPr>
-          <p:cNvPr id="4" name="Title 20"/>
-          <p:cNvSpPr txBox="1">
-            <a:spLocks/>
-          </p:cNvSpPr>
-          <p:nvPr/>
-        </p:nvSpPr>
-        <p:spPr>
-          <a:xfrm>
-            <a:off x="101275" y="5705312"/>
-            <a:ext cx="2891307" cy="1152688"/>
-          </a:xfrm>
-          <a:prstGeom prst="rect">
-            <a:avLst/>
-          </a:prstGeom>
-          <a:noFill/>
-          <a:ln>
-            <a:noFill/>
-          </a:ln>
-        </p:spPr>
-        <p:txBody>
-          <a:bodyPr vert="horz" lIns="91440" tIns="45720" rIns="91440" bIns="45720" rtlCol="0" anchor="b">
-            <a:normAutofit/>
-          </a:bodyPr>
-          <a:lstStyle>
-            <a:lvl1pPr marL="0" indent="0" algn="l" defTabSz="457200" rtl="0" eaLnBrk="1" latinLnBrk="0" hangingPunct="1">
-              <a:spcBef>
-                <a:spcPct val="0"/>
-              </a:spcBef>
-              <a:buNone/>
-              <a:defRPr sz="3200" b="0" i="0" kern="1200" cap="none">
-                <a:solidFill>
-                  <a:srgbClr val="FFFFFF"/>
-                </a:solidFill>
-                <a:latin typeface="Arial Black" charset="0"/>
-                <a:ea typeface="Arial Black" charset="0"/>
-                <a:cs typeface="Arial Black" charset="0"/>
-              </a:defRPr>
-            </a:lvl1pPr>
-          </a:lstStyle>
-          <a:p>
-            <a:r>
-              <a:rPr lang="en-US" sz="1800" dirty="0"/>
-              <a:t>TESTING AND</a:t>
-            </a:r>
-          </a:p>
-          <a:p>
-            <a:r>
-              <a:rPr lang="en-US" sz="1800" dirty="0"/>
-              <a:t>VALIDATION</a:t>
-            </a:r>
-          </a:p>
-          <a:p>
-            <a:r>
-              <a:rPr lang="en-US" sz="1800" dirty="0"/>
-              <a:t>PLATFORMS</a:t>
-            </a:r>
+            <a:r>
+              <a:rPr lang="es-ES" dirty="0" err="1"/>
+              <a:t>Testing</a:t>
+            </a:r>
+            <a:r>
+              <a:rPr lang="es-ES" dirty="0"/>
+              <a:t> and </a:t>
+            </a:r>
+            <a:r>
+              <a:rPr lang="es-ES" dirty="0" err="1"/>
+              <a:t>validation</a:t>
+            </a:r>
+            <a:r>
+              <a:rPr lang="es-ES" dirty="0"/>
+              <a:t> </a:t>
+            </a:r>
+            <a:r>
+              <a:rPr lang="es-ES" dirty="0" err="1"/>
+              <a:t>plaforms</a:t>
+            </a:r>
+            <a:endParaRPr lang="es-ES" dirty="0"/>
+          </a:p>
+          <a:p>
+            <a:r>
+              <a:rPr lang="es-ES" dirty="0"/>
+              <a:t>Master </a:t>
+            </a:r>
+            <a:r>
+              <a:rPr lang="es-ES" dirty="0" err="1"/>
+              <a:t>Degree</a:t>
+            </a:r>
+            <a:r>
+              <a:rPr lang="es-ES" dirty="0"/>
+              <a:t> in Smart Energy </a:t>
+            </a:r>
+            <a:r>
+              <a:rPr lang="es-ES" dirty="0" err="1"/>
+              <a:t>Systems</a:t>
+            </a:r>
+            <a:endParaRPr lang="es-ES" dirty="0"/>
           </a:p>
         </p:txBody>
       </p:sp>
     </p:spTree>
     <p:extLst>
       <p:ext uri="{BB962C8B-B14F-4D97-AF65-F5344CB8AC3E}">
-        <p14:creationId xmlns:p14="http://schemas.microsoft.com/office/powerpoint/2010/main" val="1671328280"/>
+        <p14:creationId xmlns:p14="http://schemas.microsoft.com/office/powerpoint/2010/main" val="2956578878"/>
       </p:ext>
     </p:extLst>
   </p:cSld>
@@ -15050,7 +15022,7 @@
             <a:fld id="{2D72A43D-7419-4C41-A920-C6E38643746D}" type="datetime3">
               <a:rPr lang="es-ES_tradnl" smtClean="0"/>
               <a:pPr/>
-              <a:t>02.01.23</a:t>
+              <a:t>14.02.23</a:t>
             </a:fld>
             <a:endParaRPr lang="en-US" dirty="0"/>
           </a:p>
@@ -15079,7 +15051,7 @@
           <a:p>
             <a:r>
               <a:rPr lang="en-US" dirty="0"/>
-              <a:t>Requirements</a:t>
+              <a:t>Writing requirements</a:t>
             </a:r>
           </a:p>
         </p:txBody>
@@ -15507,43 +15479,6 @@
           </a:p>
         </p:txBody>
       </p:sp>
-      <p:sp>
-        <p:nvSpPr>
-          <p:cNvPr id="23" name="CuadroTexto 22">
-            <a:extLst>
-              <a:ext uri="{FF2B5EF4-FFF2-40B4-BE49-F238E27FC236}">
-                <a16:creationId xmlns:a16="http://schemas.microsoft.com/office/drawing/2014/main" id="{EEB4F30C-DA78-4051-9D65-D7E469466C0A}"/>
-              </a:ext>
-            </a:extLst>
-          </p:cNvPr>
-          <p:cNvSpPr txBox="1"/>
-          <p:nvPr/>
-        </p:nvSpPr>
-        <p:spPr>
-          <a:xfrm>
-            <a:off x="1461662" y="3915273"/>
-            <a:ext cx="3813724" cy="1200329"/>
-          </a:xfrm>
-          <a:prstGeom prst="rect">
-            <a:avLst/>
-          </a:prstGeom>
-          <a:noFill/>
-        </p:spPr>
-        <p:txBody>
-          <a:bodyPr wrap="square">
-            <a:spAutoFit/>
-          </a:bodyPr>
-          <a:lstStyle/>
-          <a:p>
-            <a:r>
-              <a:rPr lang="en-US" dirty="0">
-                <a:latin typeface="Arial Nova Light" panose="020B0304020202020204" pitchFamily="34" charset="0"/>
-              </a:rPr>
-              <a:t>When the converter is working at its output nominal power, the power losses shall be smaller or equal to a 5 % of the nominal output power.</a:t>
-            </a:r>
-          </a:p>
-        </p:txBody>
-      </p:sp>
     </p:spTree>
     <p:extLst>
       <p:ext uri="{BB962C8B-B14F-4D97-AF65-F5344CB8AC3E}">
@@ -15598,7 +15533,7 @@
             <a:fld id="{2D72A43D-7419-4C41-A920-C6E38643746D}" type="datetime3">
               <a:rPr lang="es-ES_tradnl" smtClean="0"/>
               <a:pPr/>
-              <a:t>02.01.23</a:t>
+              <a:t>14.02.23</a:t>
             </a:fld>
             <a:endParaRPr lang="en-US" dirty="0"/>
           </a:p>
@@ -15627,7 +15562,7 @@
           <a:p>
             <a:r>
               <a:rPr lang="en-US" dirty="0"/>
-              <a:t>Requirements</a:t>
+              <a:t>Writing requirements</a:t>
             </a:r>
           </a:p>
         </p:txBody>
@@ -16048,43 +15983,6 @@
           </a:p>
         </p:txBody>
       </p:sp>
-      <p:sp>
-        <p:nvSpPr>
-          <p:cNvPr id="23" name="CuadroTexto 22">
-            <a:extLst>
-              <a:ext uri="{FF2B5EF4-FFF2-40B4-BE49-F238E27FC236}">
-                <a16:creationId xmlns:a16="http://schemas.microsoft.com/office/drawing/2014/main" id="{EEB4F30C-DA78-4051-9D65-D7E469466C0A}"/>
-              </a:ext>
-            </a:extLst>
-          </p:cNvPr>
-          <p:cNvSpPr txBox="1"/>
-          <p:nvPr/>
-        </p:nvSpPr>
-        <p:spPr>
-          <a:xfrm>
-            <a:off x="1550651" y="4049935"/>
-            <a:ext cx="3813724" cy="923330"/>
-          </a:xfrm>
-          <a:prstGeom prst="rect">
-            <a:avLst/>
-          </a:prstGeom>
-          <a:noFill/>
-        </p:spPr>
-        <p:txBody>
-          <a:bodyPr wrap="square">
-            <a:spAutoFit/>
-          </a:bodyPr>
-          <a:lstStyle/>
-          <a:p>
-            <a:r>
-              <a:rPr lang="en-US" dirty="0">
-                <a:latin typeface="Arial Nova Light" panose="020B0304020202020204" pitchFamily="34" charset="0"/>
-              </a:rPr>
-              <a:t>The voltage range of all analogue input channels shall be between 0 V and 5 V.</a:t>
-            </a:r>
-          </a:p>
-        </p:txBody>
-      </p:sp>
     </p:spTree>
     <p:extLst>
       <p:ext uri="{BB962C8B-B14F-4D97-AF65-F5344CB8AC3E}">
@@ -16139,7 +16037,7 @@
             <a:fld id="{2D72A43D-7419-4C41-A920-C6E38643746D}" type="datetime3">
               <a:rPr lang="es-ES_tradnl" smtClean="0"/>
               <a:pPr/>
-              <a:t>02.01.23</a:t>
+              <a:t>14.02.23</a:t>
             </a:fld>
             <a:endParaRPr lang="en-US" dirty="0"/>
           </a:p>
@@ -16168,7 +16066,7 @@
           <a:p>
             <a:r>
               <a:rPr lang="en-US" dirty="0"/>
-              <a:t>Requirements</a:t>
+              <a:t>Writing requirements</a:t>
             </a:r>
           </a:p>
         </p:txBody>
@@ -16874,43 +16772,6 @@
           </a:p>
         </p:txBody>
       </p:sp>
-      <p:sp>
-        <p:nvSpPr>
-          <p:cNvPr id="23" name="CuadroTexto 22">
-            <a:extLst>
-              <a:ext uri="{FF2B5EF4-FFF2-40B4-BE49-F238E27FC236}">
-                <a16:creationId xmlns:a16="http://schemas.microsoft.com/office/drawing/2014/main" id="{EEB4F30C-DA78-4051-9D65-D7E469466C0A}"/>
-              </a:ext>
-            </a:extLst>
-          </p:cNvPr>
-          <p:cNvSpPr txBox="1"/>
-          <p:nvPr/>
-        </p:nvSpPr>
-        <p:spPr>
-          <a:xfrm>
-            <a:off x="1383719" y="4198018"/>
-            <a:ext cx="4120265" cy="646331"/>
-          </a:xfrm>
-          <a:prstGeom prst="rect">
-            <a:avLst/>
-          </a:prstGeom>
-          <a:noFill/>
-        </p:spPr>
-        <p:txBody>
-          <a:bodyPr wrap="square">
-            <a:spAutoFit/>
-          </a:bodyPr>
-          <a:lstStyle/>
-          <a:p>
-            <a:r>
-              <a:rPr lang="en-US" dirty="0">
-                <a:latin typeface="Arial Nova Light" panose="020B0304020202020204" pitchFamily="34" charset="0"/>
-              </a:rPr>
-              <a:t>The maximum input voltage for analogue input channels shall be 5 V.</a:t>
-            </a:r>
-          </a:p>
-        </p:txBody>
-      </p:sp>
       <p:pic>
         <p:nvPicPr>
           <p:cNvPr id="17" name="Gráfico 16" descr="Marca de verificación con relleno sólido">
@@ -17049,43 +16910,6 @@
           </a:p>
         </p:txBody>
       </p:sp>
-      <p:sp>
-        <p:nvSpPr>
-          <p:cNvPr id="25" name="CuadroTexto 24">
-            <a:extLst>
-              <a:ext uri="{FF2B5EF4-FFF2-40B4-BE49-F238E27FC236}">
-                <a16:creationId xmlns:a16="http://schemas.microsoft.com/office/drawing/2014/main" id="{94109E54-F730-493C-9F02-6DB727765497}"/>
-              </a:ext>
-            </a:extLst>
-          </p:cNvPr>
-          <p:cNvSpPr txBox="1"/>
-          <p:nvPr/>
-        </p:nvSpPr>
-        <p:spPr>
-          <a:xfrm>
-            <a:off x="1383719" y="5236795"/>
-            <a:ext cx="4226963" cy="646331"/>
-          </a:xfrm>
-          <a:prstGeom prst="rect">
-            <a:avLst/>
-          </a:prstGeom>
-          <a:noFill/>
-        </p:spPr>
-        <p:txBody>
-          <a:bodyPr wrap="square">
-            <a:spAutoFit/>
-          </a:bodyPr>
-          <a:lstStyle/>
-          <a:p>
-            <a:r>
-              <a:rPr lang="en-US" dirty="0">
-                <a:latin typeface="Arial Nova Light" panose="020B0304020202020204" pitchFamily="34" charset="0"/>
-              </a:rPr>
-              <a:t>The maximum input current for analogue input channels shall be 200 mA.</a:t>
-            </a:r>
-          </a:p>
-        </p:txBody>
-      </p:sp>
     </p:spTree>
     <p:extLst>
       <p:ext uri="{BB962C8B-B14F-4D97-AF65-F5344CB8AC3E}">
@@ -17140,7 +16964,7 @@
             <a:fld id="{2D72A43D-7419-4C41-A920-C6E38643746D}" type="datetime3">
               <a:rPr lang="es-ES_tradnl" smtClean="0"/>
               <a:pPr/>
-              <a:t>02.01.23</a:t>
+              <a:t>14.02.23</a:t>
             </a:fld>
             <a:endParaRPr lang="en-US" dirty="0"/>
           </a:p>
@@ -17169,7 +16993,7 @@
           <a:p>
             <a:r>
               <a:rPr lang="en-US" dirty="0"/>
-              <a:t>Requirements</a:t>
+              <a:t>Writing requirements</a:t>
             </a:r>
           </a:p>
         </p:txBody>
@@ -18102,43 +17926,6 @@
           </a:p>
         </p:txBody>
       </p:sp>
-      <p:sp>
-        <p:nvSpPr>
-          <p:cNvPr id="23" name="CuadroTexto 22">
-            <a:extLst>
-              <a:ext uri="{FF2B5EF4-FFF2-40B4-BE49-F238E27FC236}">
-                <a16:creationId xmlns:a16="http://schemas.microsoft.com/office/drawing/2014/main" id="{EEB4F30C-DA78-4051-9D65-D7E469466C0A}"/>
-              </a:ext>
-            </a:extLst>
-          </p:cNvPr>
-          <p:cNvSpPr txBox="1"/>
-          <p:nvPr/>
-        </p:nvSpPr>
-        <p:spPr>
-          <a:xfrm>
-            <a:off x="1383720" y="5265285"/>
-            <a:ext cx="4120265" cy="646331"/>
-          </a:xfrm>
-          <a:prstGeom prst="rect">
-            <a:avLst/>
-          </a:prstGeom>
-          <a:noFill/>
-        </p:spPr>
-        <p:txBody>
-          <a:bodyPr wrap="square">
-            <a:spAutoFit/>
-          </a:bodyPr>
-          <a:lstStyle/>
-          <a:p>
-            <a:r>
-              <a:rPr lang="en-US" dirty="0">
-                <a:latin typeface="Arial Nova Light" panose="020B0304020202020204" pitchFamily="34" charset="0"/>
-              </a:rPr>
-              <a:t>The input voltage shall be amplified by a factor of 2. </a:t>
-            </a:r>
-          </a:p>
-        </p:txBody>
-      </p:sp>
     </p:spTree>
     <p:extLst>
       <p:ext uri="{BB962C8B-B14F-4D97-AF65-F5344CB8AC3E}">
@@ -18193,7 +17980,7 @@
             <a:fld id="{2D72A43D-7419-4C41-A920-C6E38643746D}" type="datetime3">
               <a:rPr lang="es-ES_tradnl" smtClean="0"/>
               <a:pPr/>
-              <a:t>02.01.23</a:t>
+              <a:t>14.02.23</a:t>
             </a:fld>
             <a:endParaRPr lang="en-US" dirty="0"/>
           </a:p>
@@ -18222,7 +18009,7 @@
           <a:p>
             <a:r>
               <a:rPr lang="en-US" dirty="0"/>
-              <a:t>Requirements</a:t>
+              <a:t>Writing requirements</a:t>
             </a:r>
           </a:p>
         </p:txBody>
@@ -18647,43 +18434,6 @@
           </a:p>
         </p:txBody>
       </p:sp>
-      <p:sp>
-        <p:nvSpPr>
-          <p:cNvPr id="23" name="CuadroTexto 22">
-            <a:extLst>
-              <a:ext uri="{FF2B5EF4-FFF2-40B4-BE49-F238E27FC236}">
-                <a16:creationId xmlns:a16="http://schemas.microsoft.com/office/drawing/2014/main" id="{EEB4F30C-DA78-4051-9D65-D7E469466C0A}"/>
-              </a:ext>
-            </a:extLst>
-          </p:cNvPr>
-          <p:cNvSpPr txBox="1"/>
-          <p:nvPr/>
-        </p:nvSpPr>
-        <p:spPr>
-          <a:xfrm>
-            <a:off x="1357587" y="4849409"/>
-            <a:ext cx="4120265" cy="1200329"/>
-          </a:xfrm>
-          <a:prstGeom prst="rect">
-            <a:avLst/>
-          </a:prstGeom>
-          <a:noFill/>
-        </p:spPr>
-        <p:txBody>
-          <a:bodyPr wrap="square">
-            <a:spAutoFit/>
-          </a:bodyPr>
-          <a:lstStyle/>
-          <a:p>
-            <a:r>
-              <a:rPr lang="en-US" dirty="0">
-                <a:latin typeface="Arial Nova Light" panose="020B0304020202020204" pitchFamily="34" charset="0"/>
-              </a:rPr>
-              <a:t>The Battery Management System shall indicate the state of charge of the battery numerically, with maximum jumps of 5%.</a:t>
-            </a:r>
-          </a:p>
-        </p:txBody>
-      </p:sp>
     </p:spTree>
     <p:extLst>
       <p:ext uri="{BB962C8B-B14F-4D97-AF65-F5344CB8AC3E}">
@@ -18819,7 +18569,7 @@
             <a:fld id="{2D72A43D-7419-4C41-A920-C6E38643746D}" type="datetime3">
               <a:rPr lang="es-ES_tradnl" smtClean="0"/>
               <a:pPr/>
-              <a:t>02.01.23</a:t>
+              <a:t>14.02.23</a:t>
             </a:fld>
             <a:endParaRPr lang="en-US" dirty="0"/>
           </a:p>
@@ -18848,7 +18598,7 @@
           <a:p>
             <a:r>
               <a:rPr lang="en-US" dirty="0"/>
-              <a:t>Requirements</a:t>
+              <a:t>Writing requirements</a:t>
             </a:r>
           </a:p>
         </p:txBody>
@@ -19395,7 +19145,7 @@
             <a:fld id="{2D72A43D-7419-4C41-A920-C6E38643746D}" type="datetime3">
               <a:rPr lang="es-ES_tradnl" smtClean="0"/>
               <a:pPr/>
-              <a:t>02.01.23</a:t>
+              <a:t>14.02.23</a:t>
             </a:fld>
             <a:endParaRPr lang="en-US" dirty="0"/>
           </a:p>
@@ -19424,7 +19174,7 @@
           <a:p>
             <a:r>
               <a:rPr lang="en-US" dirty="0"/>
-              <a:t>Requirements</a:t>
+              <a:t>Writing requirements</a:t>
             </a:r>
           </a:p>
         </p:txBody>
@@ -20114,7 +19864,7 @@
             <a:fld id="{2D72A43D-7419-4C41-A920-C6E38643746D}" type="datetime3">
               <a:rPr lang="es-ES_tradnl" smtClean="0"/>
               <a:pPr/>
-              <a:t>02.01.23</a:t>
+              <a:t>14.02.23</a:t>
             </a:fld>
             <a:endParaRPr lang="en-US" dirty="0"/>
           </a:p>
@@ -20143,7 +19893,7 @@
           <a:p>
             <a:r>
               <a:rPr lang="en-US" dirty="0"/>
-              <a:t>Requirements</a:t>
+              <a:t>Writing requirements</a:t>
             </a:r>
           </a:p>
         </p:txBody>
@@ -20493,6 +20243,419 @@
       </p:grpSpPr>
       <p:sp>
         <p:nvSpPr>
+          <p:cNvPr id="7" name="Marcador de contenido 5"/>
+          <p:cNvSpPr>
+            <a:spLocks noGrp="1"/>
+          </p:cNvSpPr>
+          <p:nvPr>
+            <p:ph sz="quarter" idx="13"/>
+          </p:nvPr>
+        </p:nvSpPr>
+        <p:spPr>
+          <a:xfrm>
+            <a:off x="422031" y="1275347"/>
+            <a:ext cx="8299939" cy="4812716"/>
+          </a:xfrm>
+        </p:spPr>
+        <p:txBody>
+          <a:bodyPr>
+            <a:normAutofit lnSpcReduction="10000"/>
+          </a:bodyPr>
+          <a:lstStyle/>
+          <a:p>
+            <a:r>
+              <a:rPr lang="es-ES" dirty="0" err="1">
+                <a:latin typeface="Arial Nova Light" panose="020B0304020202020204" pitchFamily="34" charset="0"/>
+              </a:rPr>
+              <a:t>Capability</a:t>
+            </a:r>
+            <a:r>
+              <a:rPr lang="es-ES" dirty="0">
+                <a:latin typeface="Arial Nova Light" panose="020B0304020202020204" pitchFamily="34" charset="0"/>
+              </a:rPr>
+              <a:t> </a:t>
+            </a:r>
+            <a:r>
+              <a:rPr lang="es-ES" dirty="0" err="1">
+                <a:latin typeface="Arial Nova Light" panose="020B0304020202020204" pitchFamily="34" charset="0"/>
+              </a:rPr>
+              <a:t>requirement</a:t>
+            </a:r>
+            <a:endParaRPr lang="es-ES" dirty="0">
+              <a:latin typeface="Arial Nova Light" panose="020B0304020202020204" pitchFamily="34" charset="0"/>
+            </a:endParaRPr>
+          </a:p>
+          <a:p>
+            <a:pPr marL="0" indent="0" algn="ctr">
+              <a:buNone/>
+            </a:pPr>
+            <a:endParaRPr lang="en-US" sz="2000" b="1" dirty="0">
+              <a:latin typeface="Arial Nova Light" panose="020B0304020202020204" pitchFamily="34" charset="0"/>
+            </a:endParaRPr>
+          </a:p>
+          <a:p>
+            <a:pPr marL="0" indent="0" algn="ctr">
+              <a:buNone/>
+            </a:pPr>
+            <a:r>
+              <a:rPr lang="en-US" sz="2000" b="1" dirty="0">
+                <a:latin typeface="Arial Nova Light" panose="020B0304020202020204" pitchFamily="34" charset="0"/>
+              </a:rPr>
+              <a:t>The </a:t>
+            </a:r>
+            <a:r>
+              <a:rPr lang="en-US" sz="2000" b="1" i="1" dirty="0">
+                <a:solidFill>
+                  <a:srgbClr val="00A3AD"/>
+                </a:solidFill>
+                <a:latin typeface="Arial Nova Light" panose="020B0304020202020204" pitchFamily="34" charset="0"/>
+              </a:rPr>
+              <a:t>stakeholder</a:t>
+            </a:r>
+            <a:r>
+              <a:rPr lang="en-US" sz="2000" b="1" dirty="0">
+                <a:latin typeface="Arial Nova Light" panose="020B0304020202020204" pitchFamily="34" charset="0"/>
+              </a:rPr>
+              <a:t> type shall be able to </a:t>
+            </a:r>
+            <a:r>
+              <a:rPr lang="en-US" sz="2000" b="1" i="1" dirty="0">
+                <a:solidFill>
+                  <a:srgbClr val="00A3AD"/>
+                </a:solidFill>
+                <a:latin typeface="Arial Nova Light" panose="020B0304020202020204" pitchFamily="34" charset="0"/>
+              </a:rPr>
+              <a:t>capability</a:t>
+            </a:r>
+          </a:p>
+          <a:p>
+            <a:pPr marL="0" indent="0" algn="ctr">
+              <a:buNone/>
+            </a:pPr>
+            <a:endParaRPr lang="en-US" sz="2000" b="1" dirty="0">
+              <a:latin typeface="Arial Nova Light" panose="020B0304020202020204" pitchFamily="34" charset="0"/>
+            </a:endParaRPr>
+          </a:p>
+          <a:p>
+            <a:pPr marL="0" indent="0" algn="ctr">
+              <a:buNone/>
+            </a:pPr>
+            <a:r>
+              <a:rPr lang="en-US" sz="2000" dirty="0">
+                <a:highlight>
+                  <a:srgbClr val="FFFFFF"/>
+                </a:highlight>
+                <a:latin typeface="Arial Nova Light" panose="020B0304020202020204" pitchFamily="34" charset="0"/>
+              </a:rPr>
+              <a:t>The </a:t>
+            </a:r>
+            <a:r>
+              <a:rPr lang="en-US" sz="2000" i="1" dirty="0">
+                <a:solidFill>
+                  <a:srgbClr val="00A3AD"/>
+                </a:solidFill>
+                <a:highlight>
+                  <a:srgbClr val="FFFFFF"/>
+                </a:highlight>
+                <a:latin typeface="Arial Nova Light" panose="020B0304020202020204" pitchFamily="34" charset="0"/>
+              </a:rPr>
+              <a:t>operator</a:t>
+            </a:r>
+            <a:r>
+              <a:rPr lang="en-US" sz="2000" dirty="0">
+                <a:highlight>
+                  <a:srgbClr val="FFFFFF"/>
+                </a:highlight>
+                <a:latin typeface="Arial Nova Light" panose="020B0304020202020204" pitchFamily="34" charset="0"/>
+              </a:rPr>
+              <a:t> shall be able to </a:t>
+            </a:r>
+            <a:r>
+              <a:rPr lang="en-US" sz="2000" i="1" dirty="0">
+                <a:solidFill>
+                  <a:srgbClr val="00A3AD"/>
+                </a:solidFill>
+                <a:highlight>
+                  <a:srgbClr val="FFFFFF"/>
+                </a:highlight>
+                <a:latin typeface="Arial Nova Light" panose="020B0304020202020204" pitchFamily="34" charset="0"/>
+              </a:rPr>
+              <a:t>switch off the machine</a:t>
+            </a:r>
+            <a:endParaRPr lang="en-US" sz="2000" b="1" dirty="0">
+              <a:latin typeface="Arial Nova Light" panose="020B0304020202020204" pitchFamily="34" charset="0"/>
+            </a:endParaRPr>
+          </a:p>
+          <a:p>
+            <a:pPr marL="0" indent="0" algn="ctr">
+              <a:buNone/>
+            </a:pPr>
+            <a:endParaRPr lang="en-US" sz="1800" dirty="0">
+              <a:highlight>
+                <a:srgbClr val="FFFF00"/>
+              </a:highlight>
+              <a:latin typeface="Arial Nova Light" panose="020B0304020202020204" pitchFamily="34" charset="0"/>
+            </a:endParaRPr>
+          </a:p>
+          <a:p>
+            <a:r>
+              <a:rPr lang="en-US" dirty="0">
+                <a:latin typeface="Arial Nova Light" panose="020B0304020202020204" pitchFamily="34" charset="0"/>
+              </a:rPr>
+              <a:t>Capability requirement with constraints</a:t>
+            </a:r>
+          </a:p>
+          <a:p>
+            <a:pPr marL="0" indent="0" algn="ctr">
+              <a:buNone/>
+            </a:pPr>
+            <a:endParaRPr lang="en-US" sz="2000" b="1" dirty="0">
+              <a:latin typeface="Arial Nova Light" panose="020B0304020202020204" pitchFamily="34" charset="0"/>
+            </a:endParaRPr>
+          </a:p>
+          <a:p>
+            <a:pPr marL="0" indent="0" algn="ctr">
+              <a:buNone/>
+            </a:pPr>
+            <a:r>
+              <a:rPr lang="en-US" sz="2000" b="1" dirty="0">
+                <a:latin typeface="Arial Nova Light" panose="020B0304020202020204" pitchFamily="34" charset="0"/>
+              </a:rPr>
+              <a:t>The </a:t>
+            </a:r>
+            <a:r>
+              <a:rPr lang="en-US" sz="2000" b="1" i="1" dirty="0">
+                <a:solidFill>
+                  <a:srgbClr val="00A3AD"/>
+                </a:solidFill>
+                <a:latin typeface="Arial Nova Light" panose="020B0304020202020204" pitchFamily="34" charset="0"/>
+              </a:rPr>
+              <a:t>stakeholder type</a:t>
+            </a:r>
+            <a:r>
+              <a:rPr lang="en-US" sz="2000" b="1" dirty="0">
+                <a:latin typeface="Arial Nova Light" panose="020B0304020202020204" pitchFamily="34" charset="0"/>
+              </a:rPr>
+              <a:t> shall be able to </a:t>
+            </a:r>
+            <a:r>
+              <a:rPr lang="en-US" sz="2000" b="1" i="1" dirty="0">
+                <a:solidFill>
+                  <a:srgbClr val="00A3AD"/>
+                </a:solidFill>
+                <a:latin typeface="Arial Nova Light" panose="020B0304020202020204" pitchFamily="34" charset="0"/>
+              </a:rPr>
+              <a:t>capability</a:t>
+            </a:r>
+          </a:p>
+          <a:p>
+            <a:pPr marL="0" indent="0" algn="ctr">
+              <a:buNone/>
+            </a:pPr>
+            <a:r>
+              <a:rPr lang="en-US" sz="2000" b="1" dirty="0">
+                <a:latin typeface="Arial Nova Light" panose="020B0304020202020204" pitchFamily="34" charset="0"/>
+              </a:rPr>
+              <a:t>within </a:t>
+            </a:r>
+            <a:r>
+              <a:rPr lang="en-US" sz="2000" b="1" i="1" dirty="0">
+                <a:solidFill>
+                  <a:srgbClr val="00A3AD"/>
+                </a:solidFill>
+                <a:latin typeface="Arial Nova Light" panose="020B0304020202020204" pitchFamily="34" charset="0"/>
+              </a:rPr>
+              <a:t>performance</a:t>
+            </a:r>
+            <a:r>
+              <a:rPr lang="en-US" sz="2000" b="1" dirty="0">
+                <a:latin typeface="Arial Nova Light" panose="020B0304020202020204" pitchFamily="34" charset="0"/>
+              </a:rPr>
+              <a:t> of </a:t>
+            </a:r>
+            <a:r>
+              <a:rPr lang="en-US" sz="2000" b="1" i="1" dirty="0">
+                <a:solidFill>
+                  <a:srgbClr val="00A3AD"/>
+                </a:solidFill>
+                <a:latin typeface="Arial Nova Light" panose="020B0304020202020204" pitchFamily="34" charset="0"/>
+              </a:rPr>
+              <a:t>event</a:t>
+            </a:r>
+          </a:p>
+          <a:p>
+            <a:pPr marL="0" indent="0" algn="ctr">
+              <a:buNone/>
+            </a:pPr>
+            <a:r>
+              <a:rPr lang="en-US" sz="2000" b="1" dirty="0">
+                <a:latin typeface="Arial Nova Light" panose="020B0304020202020204" pitchFamily="34" charset="0"/>
+              </a:rPr>
+              <a:t>while </a:t>
+            </a:r>
+            <a:r>
+              <a:rPr lang="en-US" sz="2000" b="1" i="1" dirty="0">
+                <a:solidFill>
+                  <a:srgbClr val="00A3AD"/>
+                </a:solidFill>
+                <a:latin typeface="Arial Nova Light" panose="020B0304020202020204" pitchFamily="34" charset="0"/>
+              </a:rPr>
+              <a:t>operational condition</a:t>
+            </a:r>
+            <a:r>
+              <a:rPr lang="en-US" sz="2000" b="1" dirty="0">
+                <a:latin typeface="Arial Nova Light" panose="020B0304020202020204" pitchFamily="34" charset="0"/>
+              </a:rPr>
+              <a:t>.</a:t>
+            </a:r>
+          </a:p>
+          <a:p>
+            <a:pPr marL="0" indent="0" algn="ctr">
+              <a:buNone/>
+            </a:pPr>
+            <a:endParaRPr lang="en-US" sz="2000" b="1" dirty="0">
+              <a:latin typeface="Arial Nova Light" panose="020B0304020202020204" pitchFamily="34" charset="0"/>
+            </a:endParaRPr>
+          </a:p>
+          <a:p>
+            <a:pPr marL="0" indent="0" algn="ctr">
+              <a:buNone/>
+            </a:pPr>
+            <a:r>
+              <a:rPr lang="en-US" sz="2000" dirty="0">
+                <a:highlight>
+                  <a:srgbClr val="FFFFFF"/>
+                </a:highlight>
+                <a:latin typeface="Arial Nova Light" panose="020B0304020202020204" pitchFamily="34" charset="0"/>
+              </a:rPr>
+              <a:t>The </a:t>
+            </a:r>
+            <a:r>
+              <a:rPr lang="en-US" sz="2000" i="1" dirty="0">
+                <a:solidFill>
+                  <a:srgbClr val="00A3AD"/>
+                </a:solidFill>
+                <a:highlight>
+                  <a:srgbClr val="FFFFFF"/>
+                </a:highlight>
+                <a:latin typeface="Arial Nova Light" panose="020B0304020202020204" pitchFamily="34" charset="0"/>
+              </a:rPr>
+              <a:t>operator</a:t>
+            </a:r>
+            <a:r>
+              <a:rPr lang="en-US" sz="2000" dirty="0">
+                <a:highlight>
+                  <a:srgbClr val="FFFFFF"/>
+                </a:highlight>
+                <a:latin typeface="Arial Nova Light" panose="020B0304020202020204" pitchFamily="34" charset="0"/>
+              </a:rPr>
+              <a:t> shall be able to </a:t>
+            </a:r>
+            <a:r>
+              <a:rPr lang="en-US" sz="2000" i="1" dirty="0">
+                <a:solidFill>
+                  <a:srgbClr val="00A3AD"/>
+                </a:solidFill>
+                <a:highlight>
+                  <a:srgbClr val="FFFFFF"/>
+                </a:highlight>
+                <a:latin typeface="Arial Nova Light" panose="020B0304020202020204" pitchFamily="34" charset="0"/>
+              </a:rPr>
+              <a:t>switch off the machine</a:t>
+            </a:r>
+            <a:r>
+              <a:rPr lang="en-US" sz="2000" dirty="0">
+                <a:highlight>
+                  <a:srgbClr val="FFFFFF"/>
+                </a:highlight>
+                <a:latin typeface="Arial Nova Light" panose="020B0304020202020204" pitchFamily="34" charset="0"/>
+              </a:rPr>
+              <a:t> within </a:t>
+            </a:r>
+            <a:r>
+              <a:rPr lang="en-US" sz="2000" i="1" dirty="0">
+                <a:solidFill>
+                  <a:srgbClr val="00A3AD"/>
+                </a:solidFill>
+                <a:highlight>
+                  <a:srgbClr val="FFFFFF"/>
+                </a:highlight>
+                <a:latin typeface="Arial Nova Light" panose="020B0304020202020204" pitchFamily="34" charset="0"/>
+              </a:rPr>
+              <a:t>3 seconds</a:t>
+            </a:r>
+            <a:r>
+              <a:rPr lang="en-US" sz="2000" dirty="0">
+                <a:highlight>
+                  <a:srgbClr val="FFFFFF"/>
+                </a:highlight>
+                <a:latin typeface="Arial Nova Light" panose="020B0304020202020204" pitchFamily="34" charset="0"/>
+              </a:rPr>
+              <a:t> of </a:t>
+            </a:r>
+            <a:r>
+              <a:rPr lang="en-US" sz="2000" i="1" dirty="0">
+                <a:solidFill>
+                  <a:srgbClr val="00A3AD"/>
+                </a:solidFill>
+                <a:highlight>
+                  <a:srgbClr val="FFFFFF"/>
+                </a:highlight>
+                <a:latin typeface="Arial Nova Light" panose="020B0304020202020204" pitchFamily="34" charset="0"/>
+              </a:rPr>
+              <a:t>overcurrent alarm activation</a:t>
+            </a:r>
+            <a:r>
+              <a:rPr lang="en-US" sz="2000" dirty="0">
+                <a:highlight>
+                  <a:srgbClr val="FFFFFF"/>
+                </a:highlight>
+                <a:latin typeface="Arial Nova Light" panose="020B0304020202020204" pitchFamily="34" charset="0"/>
+              </a:rPr>
+              <a:t> while in </a:t>
+            </a:r>
+            <a:r>
+              <a:rPr lang="en-US" sz="2000" i="1" dirty="0">
+                <a:solidFill>
+                  <a:srgbClr val="00A3AD"/>
+                </a:solidFill>
+                <a:highlight>
+                  <a:srgbClr val="FFFFFF"/>
+                </a:highlight>
+                <a:latin typeface="Arial Nova Light" panose="020B0304020202020204" pitchFamily="34" charset="0"/>
+              </a:rPr>
+              <a:t>rated conditions</a:t>
+            </a:r>
+            <a:r>
+              <a:rPr lang="en-US" sz="2000" dirty="0">
+                <a:highlight>
+                  <a:srgbClr val="FFFFFF"/>
+                </a:highlight>
+                <a:latin typeface="Arial Nova Light" panose="020B0304020202020204" pitchFamily="34" charset="0"/>
+              </a:rPr>
+              <a:t>.</a:t>
+            </a:r>
+            <a:endParaRPr lang="en-US" dirty="0">
+              <a:latin typeface="Arial Nova Light" panose="020B0304020202020204" pitchFamily="34" charset="0"/>
+            </a:endParaRPr>
+          </a:p>
+          <a:p>
+            <a:pPr marL="0" indent="0" algn="ctr">
+              <a:buNone/>
+            </a:pPr>
+            <a:endParaRPr lang="en-US" dirty="0">
+              <a:latin typeface="Arial Nova Light" panose="020B0304020202020204" pitchFamily="34" charset="0"/>
+            </a:endParaRPr>
+          </a:p>
+          <a:p>
+            <a:endParaRPr lang="es-ES" dirty="0">
+              <a:latin typeface="Arial Nova Light" panose="020B0304020202020204" pitchFamily="34" charset="0"/>
+            </a:endParaRPr>
+          </a:p>
+        </p:txBody>
+      </p:sp>
+      <p:sp>
+        <p:nvSpPr>
           <p:cNvPr id="2" name="Marcador de fecha 1">
             <a:extLst>
               <a:ext uri="{FF2B5EF4-FFF2-40B4-BE49-F238E27FC236}">
@@ -20515,7 +20678,7 @@
             <a:fld id="{2D72A43D-7419-4C41-A920-C6E38643746D}" type="datetime3">
               <a:rPr lang="es-ES_tradnl" smtClean="0"/>
               <a:pPr/>
-              <a:t>02.01.23</a:t>
+              <a:t>14.02.23</a:t>
             </a:fld>
             <a:endParaRPr lang="en-US" dirty="0"/>
           </a:p>
@@ -20544,7 +20707,7 @@
           <a:p>
             <a:r>
               <a:rPr lang="en-US" dirty="0"/>
-              <a:t>Requirements</a:t>
+              <a:t>Writing requirements</a:t>
             </a:r>
           </a:p>
         </p:txBody>
@@ -20621,432 +20784,6 @@
               <a:t>structures</a:t>
             </a:r>
             <a:endParaRPr lang="es-ES" dirty="0"/>
-          </a:p>
-        </p:txBody>
-      </p:sp>
-      <p:sp>
-        <p:nvSpPr>
-          <p:cNvPr id="7" name="Marcador de contenido 5"/>
-          <p:cNvSpPr>
-            <a:spLocks noGrp="1"/>
-          </p:cNvSpPr>
-          <p:nvPr>
-            <p:ph sz="quarter" idx="13"/>
-          </p:nvPr>
-        </p:nvSpPr>
-        <p:spPr>
-          <a:xfrm>
-            <a:off x="422031" y="1275347"/>
-            <a:ext cx="8299939" cy="4812716"/>
-          </a:xfrm>
-        </p:spPr>
-        <p:txBody>
-          <a:bodyPr>
-            <a:normAutofit lnSpcReduction="10000"/>
-          </a:bodyPr>
-          <a:lstStyle/>
-          <a:p>
-            <a:r>
-              <a:rPr lang="es-ES" dirty="0" err="1">
-                <a:latin typeface="Arial Nova Light" panose="020B0304020202020204" pitchFamily="34" charset="0"/>
-              </a:rPr>
-              <a:t>Capability</a:t>
-            </a:r>
-            <a:r>
-              <a:rPr lang="es-ES" dirty="0">
-                <a:latin typeface="Arial Nova Light" panose="020B0304020202020204" pitchFamily="34" charset="0"/>
-              </a:rPr>
-              <a:t> </a:t>
-            </a:r>
-            <a:r>
-              <a:rPr lang="es-ES" dirty="0" err="1">
-                <a:latin typeface="Arial Nova Light" panose="020B0304020202020204" pitchFamily="34" charset="0"/>
-              </a:rPr>
-              <a:t>requirement</a:t>
-            </a:r>
-            <a:endParaRPr lang="es-ES" dirty="0">
-              <a:latin typeface="Arial Nova Light" panose="020B0304020202020204" pitchFamily="34" charset="0"/>
-            </a:endParaRPr>
-          </a:p>
-          <a:p>
-            <a:pPr marL="0" indent="0" algn="ctr">
-              <a:buNone/>
-            </a:pPr>
-            <a:endParaRPr lang="en-US" sz="2000" b="1" dirty="0">
-              <a:latin typeface="Arial Nova Light" panose="020B0304020202020204" pitchFamily="34" charset="0"/>
-            </a:endParaRPr>
-          </a:p>
-          <a:p>
-            <a:pPr marL="0" indent="0" algn="ctr">
-              <a:buNone/>
-            </a:pPr>
-            <a:r>
-              <a:rPr lang="en-US" sz="2000" b="1" dirty="0">
-                <a:latin typeface="Arial Nova Light" panose="020B0304020202020204" pitchFamily="34" charset="0"/>
-              </a:rPr>
-              <a:t>The </a:t>
-            </a:r>
-            <a:r>
-              <a:rPr lang="en-US" sz="2000" b="1" i="1" dirty="0">
-                <a:solidFill>
-                  <a:srgbClr val="00A3AD"/>
-                </a:solidFill>
-                <a:latin typeface="Arial Nova Light" panose="020B0304020202020204" pitchFamily="34" charset="0"/>
-              </a:rPr>
-              <a:t>stakeholder</a:t>
-            </a:r>
-            <a:r>
-              <a:rPr lang="en-US" sz="2000" b="1" dirty="0">
-                <a:latin typeface="Arial Nova Light" panose="020B0304020202020204" pitchFamily="34" charset="0"/>
-              </a:rPr>
-              <a:t> type shall be able to </a:t>
-            </a:r>
-            <a:r>
-              <a:rPr lang="en-US" sz="2000" b="1" i="1" dirty="0">
-                <a:solidFill>
-                  <a:srgbClr val="00A3AD"/>
-                </a:solidFill>
-                <a:latin typeface="Arial Nova Light" panose="020B0304020202020204" pitchFamily="34" charset="0"/>
-              </a:rPr>
-              <a:t>capability</a:t>
-            </a:r>
-          </a:p>
-          <a:p>
-            <a:pPr marL="0" indent="0" algn="ctr">
-              <a:buNone/>
-            </a:pPr>
-            <a:endParaRPr lang="en-US" sz="2000" b="1" dirty="0">
-              <a:latin typeface="Arial Nova Light" panose="020B0304020202020204" pitchFamily="34" charset="0"/>
-            </a:endParaRPr>
-          </a:p>
-          <a:p>
-            <a:pPr marL="0" indent="0" algn="ctr">
-              <a:buNone/>
-            </a:pPr>
-            <a:r>
-              <a:rPr lang="en-US" sz="2000" dirty="0">
-                <a:highlight>
-                  <a:srgbClr val="FFFFFF"/>
-                </a:highlight>
-                <a:latin typeface="Arial Nova Light" panose="020B0304020202020204" pitchFamily="34" charset="0"/>
-              </a:rPr>
-              <a:t>The </a:t>
-            </a:r>
-            <a:r>
-              <a:rPr lang="en-US" sz="2000" i="1" dirty="0">
-                <a:solidFill>
-                  <a:srgbClr val="00A3AD"/>
-                </a:solidFill>
-                <a:highlight>
-                  <a:srgbClr val="FFFFFF"/>
-                </a:highlight>
-                <a:latin typeface="Arial Nova Light" panose="020B0304020202020204" pitchFamily="34" charset="0"/>
-              </a:rPr>
-              <a:t>operator</a:t>
-            </a:r>
-            <a:r>
-              <a:rPr lang="en-US" sz="2000" dirty="0">
-                <a:highlight>
-                  <a:srgbClr val="FFFFFF"/>
-                </a:highlight>
-                <a:latin typeface="Arial Nova Light" panose="020B0304020202020204" pitchFamily="34" charset="0"/>
-              </a:rPr>
-              <a:t> shall be able to </a:t>
-            </a:r>
-            <a:r>
-              <a:rPr lang="en-US" sz="2000" i="1" dirty="0">
-                <a:solidFill>
-                  <a:srgbClr val="00A3AD"/>
-                </a:solidFill>
-                <a:highlight>
-                  <a:srgbClr val="FFFFFF"/>
-                </a:highlight>
-                <a:latin typeface="Arial Nova Light" panose="020B0304020202020204" pitchFamily="34" charset="0"/>
-              </a:rPr>
-              <a:t>switch off the machine</a:t>
-            </a:r>
-            <a:endParaRPr lang="en-US" sz="2000" b="1" dirty="0">
-              <a:latin typeface="Arial Nova Light" panose="020B0304020202020204" pitchFamily="34" charset="0"/>
-            </a:endParaRPr>
-          </a:p>
-          <a:p>
-            <a:pPr marL="0" indent="0" algn="ctr">
-              <a:buNone/>
-            </a:pPr>
-            <a:endParaRPr lang="en-US" sz="1800" dirty="0">
-              <a:highlight>
-                <a:srgbClr val="FFFF00"/>
-              </a:highlight>
-              <a:latin typeface="Arial Nova Light" panose="020B0304020202020204" pitchFamily="34" charset="0"/>
-            </a:endParaRPr>
-          </a:p>
-          <a:p>
-            <a:r>
-              <a:rPr lang="en-US" dirty="0">
-                <a:latin typeface="Arial Nova Light" panose="020B0304020202020204" pitchFamily="34" charset="0"/>
-              </a:rPr>
-              <a:t>Capability requirement with constraints</a:t>
-            </a:r>
-          </a:p>
-          <a:p>
-            <a:pPr marL="0" indent="0" algn="ctr">
-              <a:buNone/>
-            </a:pPr>
-            <a:endParaRPr lang="en-US" sz="2000" b="1" dirty="0">
-              <a:latin typeface="Arial Nova Light" panose="020B0304020202020204" pitchFamily="34" charset="0"/>
-            </a:endParaRPr>
-          </a:p>
-          <a:p>
-            <a:pPr marL="0" indent="0" algn="ctr">
-              <a:buNone/>
-            </a:pPr>
-            <a:r>
-              <a:rPr lang="en-US" sz="2000" b="1" dirty="0">
-                <a:latin typeface="Arial Nova Light" panose="020B0304020202020204" pitchFamily="34" charset="0"/>
-              </a:rPr>
-              <a:t>The </a:t>
-            </a:r>
-            <a:r>
-              <a:rPr lang="en-US" sz="2000" b="1" i="1" dirty="0">
-                <a:solidFill>
-                  <a:srgbClr val="00A3AD"/>
-                </a:solidFill>
-                <a:latin typeface="Arial Nova Light" panose="020B0304020202020204" pitchFamily="34" charset="0"/>
-              </a:rPr>
-              <a:t>stakeholder type</a:t>
-            </a:r>
-            <a:r>
-              <a:rPr lang="en-US" sz="2000" b="1" dirty="0">
-                <a:latin typeface="Arial Nova Light" panose="020B0304020202020204" pitchFamily="34" charset="0"/>
-              </a:rPr>
-              <a:t> shall be able to </a:t>
-            </a:r>
-            <a:r>
-              <a:rPr lang="en-US" sz="2000" b="1" i="1" dirty="0">
-                <a:solidFill>
-                  <a:srgbClr val="00A3AD"/>
-                </a:solidFill>
-                <a:latin typeface="Arial Nova Light" panose="020B0304020202020204" pitchFamily="34" charset="0"/>
-              </a:rPr>
-              <a:t>capability</a:t>
-            </a:r>
-          </a:p>
-          <a:p>
-            <a:pPr marL="0" indent="0" algn="ctr">
-              <a:buNone/>
-            </a:pPr>
-            <a:r>
-              <a:rPr lang="en-US" sz="2000" b="1" dirty="0">
-                <a:latin typeface="Arial Nova Light" panose="020B0304020202020204" pitchFamily="34" charset="0"/>
-              </a:rPr>
-              <a:t>within </a:t>
-            </a:r>
-            <a:r>
-              <a:rPr lang="en-US" sz="2000" b="1" i="1" dirty="0">
-                <a:solidFill>
-                  <a:srgbClr val="00A3AD"/>
-                </a:solidFill>
-                <a:latin typeface="Arial Nova Light" panose="020B0304020202020204" pitchFamily="34" charset="0"/>
-              </a:rPr>
-              <a:t>performance</a:t>
-            </a:r>
-            <a:r>
-              <a:rPr lang="en-US" sz="2000" b="1" dirty="0">
-                <a:latin typeface="Arial Nova Light" panose="020B0304020202020204" pitchFamily="34" charset="0"/>
-              </a:rPr>
-              <a:t> of </a:t>
-            </a:r>
-            <a:r>
-              <a:rPr lang="en-US" sz="2000" b="1" i="1" dirty="0">
-                <a:solidFill>
-                  <a:srgbClr val="00A3AD"/>
-                </a:solidFill>
-                <a:latin typeface="Arial Nova Light" panose="020B0304020202020204" pitchFamily="34" charset="0"/>
-              </a:rPr>
-              <a:t>event</a:t>
-            </a:r>
-          </a:p>
-          <a:p>
-            <a:pPr marL="0" indent="0" algn="ctr">
-              <a:buNone/>
-            </a:pPr>
-            <a:r>
-              <a:rPr lang="en-US" sz="2000" b="1" dirty="0">
-                <a:latin typeface="Arial Nova Light" panose="020B0304020202020204" pitchFamily="34" charset="0"/>
-              </a:rPr>
-              <a:t>while </a:t>
-            </a:r>
-            <a:r>
-              <a:rPr lang="en-US" sz="2000" b="1" i="1" dirty="0">
-                <a:solidFill>
-                  <a:srgbClr val="00A3AD"/>
-                </a:solidFill>
-                <a:latin typeface="Arial Nova Light" panose="020B0304020202020204" pitchFamily="34" charset="0"/>
-              </a:rPr>
-              <a:t>operational condition</a:t>
-            </a:r>
-            <a:r>
-              <a:rPr lang="en-US" sz="2000" b="1" dirty="0">
-                <a:latin typeface="Arial Nova Light" panose="020B0304020202020204" pitchFamily="34" charset="0"/>
-              </a:rPr>
-              <a:t>.</a:t>
-            </a:r>
-          </a:p>
-          <a:p>
-            <a:pPr marL="0" indent="0" algn="ctr">
-              <a:buNone/>
-            </a:pPr>
-            <a:endParaRPr lang="en-US" sz="2000" b="1" dirty="0">
-              <a:latin typeface="Arial Nova Light" panose="020B0304020202020204" pitchFamily="34" charset="0"/>
-            </a:endParaRPr>
-          </a:p>
-          <a:p>
-            <a:pPr marL="0" indent="0" algn="ctr">
-              <a:buNone/>
-            </a:pPr>
-            <a:r>
-              <a:rPr lang="en-US" sz="2000" dirty="0">
-                <a:highlight>
-                  <a:srgbClr val="FFFFFF"/>
-                </a:highlight>
-                <a:latin typeface="Arial Nova Light" panose="020B0304020202020204" pitchFamily="34" charset="0"/>
-              </a:rPr>
-              <a:t>The </a:t>
-            </a:r>
-            <a:r>
-              <a:rPr lang="en-US" sz="2000" i="1" dirty="0">
-                <a:solidFill>
-                  <a:srgbClr val="00A3AD"/>
-                </a:solidFill>
-                <a:highlight>
-                  <a:srgbClr val="FFFFFF"/>
-                </a:highlight>
-                <a:latin typeface="Arial Nova Light" panose="020B0304020202020204" pitchFamily="34" charset="0"/>
-              </a:rPr>
-              <a:t>operator</a:t>
-            </a:r>
-            <a:r>
-              <a:rPr lang="en-US" sz="2000" dirty="0">
-                <a:highlight>
-                  <a:srgbClr val="FFFFFF"/>
-                </a:highlight>
-                <a:latin typeface="Arial Nova Light" panose="020B0304020202020204" pitchFamily="34" charset="0"/>
-              </a:rPr>
-              <a:t> shall be able to </a:t>
-            </a:r>
-            <a:r>
-              <a:rPr lang="en-US" sz="2000" i="1" dirty="0">
-                <a:solidFill>
-                  <a:srgbClr val="00A3AD"/>
-                </a:solidFill>
-                <a:highlight>
-                  <a:srgbClr val="FFFFFF"/>
-                </a:highlight>
-                <a:latin typeface="Arial Nova Light" panose="020B0304020202020204" pitchFamily="34" charset="0"/>
-              </a:rPr>
-              <a:t>switch off the machine</a:t>
-            </a:r>
-            <a:r>
-              <a:rPr lang="en-US" sz="2000" dirty="0">
-                <a:highlight>
-                  <a:srgbClr val="FFFFFF"/>
-                </a:highlight>
-                <a:latin typeface="Arial Nova Light" panose="020B0304020202020204" pitchFamily="34" charset="0"/>
-              </a:rPr>
-              <a:t> within </a:t>
-            </a:r>
-            <a:r>
-              <a:rPr lang="en-US" sz="2000" i="1" dirty="0">
-                <a:solidFill>
-                  <a:srgbClr val="00A3AD"/>
-                </a:solidFill>
-                <a:highlight>
-                  <a:srgbClr val="FFFFFF"/>
-                </a:highlight>
-                <a:latin typeface="Arial Nova Light" panose="020B0304020202020204" pitchFamily="34" charset="0"/>
-              </a:rPr>
-              <a:t>3 seconds</a:t>
-            </a:r>
-            <a:r>
-              <a:rPr lang="en-US" sz="2000" dirty="0">
-                <a:highlight>
-                  <a:srgbClr val="FFFFFF"/>
-                </a:highlight>
-                <a:latin typeface="Arial Nova Light" panose="020B0304020202020204" pitchFamily="34" charset="0"/>
-              </a:rPr>
-              <a:t> of </a:t>
-            </a:r>
-            <a:r>
-              <a:rPr lang="en-US" sz="2000" i="1" dirty="0">
-                <a:solidFill>
-                  <a:srgbClr val="00A3AD"/>
-                </a:solidFill>
-                <a:highlight>
-                  <a:srgbClr val="FFFFFF"/>
-                </a:highlight>
-                <a:latin typeface="Arial Nova Light" panose="020B0304020202020204" pitchFamily="34" charset="0"/>
-              </a:rPr>
-              <a:t>overcurrent alarm activation</a:t>
-            </a:r>
-            <a:r>
-              <a:rPr lang="en-US" sz="2000" dirty="0">
-                <a:highlight>
-                  <a:srgbClr val="FFFFFF"/>
-                </a:highlight>
-                <a:latin typeface="Arial Nova Light" panose="020B0304020202020204" pitchFamily="34" charset="0"/>
-              </a:rPr>
-              <a:t> while in </a:t>
-            </a:r>
-            <a:r>
-              <a:rPr lang="en-US" sz="2000" i="1" dirty="0">
-                <a:solidFill>
-                  <a:srgbClr val="00A3AD"/>
-                </a:solidFill>
-                <a:highlight>
-                  <a:srgbClr val="FFFFFF"/>
-                </a:highlight>
-                <a:latin typeface="Arial Nova Light" panose="020B0304020202020204" pitchFamily="34" charset="0"/>
-              </a:rPr>
-              <a:t>rated conditions</a:t>
-            </a:r>
-            <a:r>
-              <a:rPr lang="en-US" sz="2000" dirty="0">
-                <a:highlight>
-                  <a:srgbClr val="FFFFFF"/>
-                </a:highlight>
-                <a:latin typeface="Arial Nova Light" panose="020B0304020202020204" pitchFamily="34" charset="0"/>
-              </a:rPr>
-              <a:t>.</a:t>
-            </a:r>
-          </a:p>
-          <a:p>
-            <a:pPr marL="0" indent="0" algn="ctr">
-              <a:buNone/>
-            </a:pPr>
-            <a:endParaRPr lang="en-US" sz="2000" b="1" dirty="0">
-              <a:latin typeface="Arial Nova Light" panose="020B0304020202020204" pitchFamily="34" charset="0"/>
-            </a:endParaRPr>
-          </a:p>
-          <a:p>
-            <a:pPr marL="0" indent="0" algn="ctr">
-              <a:buNone/>
-            </a:pPr>
-            <a:endParaRPr lang="en-US" dirty="0">
-              <a:latin typeface="Arial Nova Light" panose="020B0304020202020204" pitchFamily="34" charset="0"/>
-            </a:endParaRPr>
-          </a:p>
-          <a:p>
-            <a:pPr marL="0" indent="0" algn="ctr">
-              <a:buNone/>
-            </a:pPr>
-            <a:endParaRPr lang="en-US" dirty="0">
-              <a:latin typeface="Arial Nova Light" panose="020B0304020202020204" pitchFamily="34" charset="0"/>
-            </a:endParaRPr>
-          </a:p>
-          <a:p>
-            <a:endParaRPr lang="es-ES" dirty="0">
-              <a:latin typeface="Arial Nova Light" panose="020B0304020202020204" pitchFamily="34" charset="0"/>
-            </a:endParaRPr>
           </a:p>
         </p:txBody>
       </p:sp>
@@ -21085,7 +20822,7 @@
           <p:cNvPr id="2" name="Marcador de fecha 1">
             <a:extLst>
               <a:ext uri="{FF2B5EF4-FFF2-40B4-BE49-F238E27FC236}">
-                <a16:creationId xmlns:a16="http://schemas.microsoft.com/office/drawing/2014/main" id="{CE37D71A-0A95-48B6-91F7-6A96CCCEEC45}"/>
+                <a16:creationId xmlns:a16="http://schemas.microsoft.com/office/drawing/2014/main" id="{38559273-7AB1-4A95-985D-22564E7DD5B1}"/>
               </a:ext>
             </a:extLst>
           </p:cNvPr>
@@ -21104,7 +20841,7 @@
             <a:fld id="{2D72A43D-7419-4C41-A920-C6E38643746D}" type="datetime3">
               <a:rPr lang="es-ES_tradnl" smtClean="0"/>
               <a:pPr/>
-              <a:t>02.01.23</a:t>
+              <a:t>14.02.23</a:t>
             </a:fld>
             <a:endParaRPr lang="en-US" dirty="0"/>
           </a:p>
@@ -21115,7 +20852,7 @@
           <p:cNvPr id="3" name="Marcador de pie de página 2">
             <a:extLst>
               <a:ext uri="{FF2B5EF4-FFF2-40B4-BE49-F238E27FC236}">
-                <a16:creationId xmlns:a16="http://schemas.microsoft.com/office/drawing/2014/main" id="{C65FDD1F-A088-42E9-99D0-10EDE0ED453B}"/>
+                <a16:creationId xmlns:a16="http://schemas.microsoft.com/office/drawing/2014/main" id="{45A5B9AB-2304-4735-B1EC-EE23ACF69CEE}"/>
               </a:ext>
             </a:extLst>
           </p:cNvPr>
@@ -21133,7 +20870,7 @@
           <a:p>
             <a:r>
               <a:rPr lang="en-US" dirty="0"/>
-              <a:t>Requirements</a:t>
+              <a:t>Writing requirements</a:t>
             </a:r>
           </a:p>
         </p:txBody>
@@ -21143,7 +20880,7 @@
           <p:cNvPr id="4" name="Marcador de número de diapositiva 3">
             <a:extLst>
               <a:ext uri="{FF2B5EF4-FFF2-40B4-BE49-F238E27FC236}">
-                <a16:creationId xmlns:a16="http://schemas.microsoft.com/office/drawing/2014/main" id="{A1F6CFB1-B273-46C4-A51D-9E7A8C23BCFA}"/>
+                <a16:creationId xmlns:a16="http://schemas.microsoft.com/office/drawing/2014/main" id="{A87072F7-DE8E-43BB-B3B5-FE1120EAF2FA}"/>
               </a:ext>
             </a:extLst>
           </p:cNvPr>
@@ -21173,7 +20910,7 @@
           <p:cNvPr id="5" name="Título 4">
             <a:extLst>
               <a:ext uri="{FF2B5EF4-FFF2-40B4-BE49-F238E27FC236}">
-                <a16:creationId xmlns:a16="http://schemas.microsoft.com/office/drawing/2014/main" id="{401EA1E0-7A88-4E73-848C-16262141EDAD}"/>
+                <a16:creationId xmlns:a16="http://schemas.microsoft.com/office/drawing/2014/main" id="{DAE9CA44-CC19-42CC-9694-3FEA44884815}"/>
               </a:ext>
             </a:extLst>
           </p:cNvPr>
@@ -21199,10 +20936,10 @@
       </p:sp>
       <p:sp>
         <p:nvSpPr>
-          <p:cNvPr id="8" name="Marcador de contenido 7">
+          <p:cNvPr id="6" name="Marcador de contenido 5">
             <a:extLst>
               <a:ext uri="{FF2B5EF4-FFF2-40B4-BE49-F238E27FC236}">
-                <a16:creationId xmlns:a16="http://schemas.microsoft.com/office/drawing/2014/main" id="{D3591743-E0F0-4145-AE42-5AB255F302E7}"/>
+                <a16:creationId xmlns:a16="http://schemas.microsoft.com/office/drawing/2014/main" id="{8D4CC84C-1219-412E-BCFA-ACBAEFA3AC3D}"/>
               </a:ext>
             </a:extLst>
           </p:cNvPr>
@@ -21288,35 +21025,95 @@
             </a:endParaRPr>
           </a:p>
           <a:p>
-            <a:pPr>
-              <a:buFont typeface="+mj-lt"/>
-              <a:buAutoNum type="arabicPeriod"/>
-            </a:pPr>
-            <a:endParaRPr lang="en-US" i="0" dirty="0">
-              <a:solidFill>
-                <a:schemeClr val="tx1"/>
-              </a:solidFill>
-              <a:effectLst/>
-              <a:latin typeface="Arial Nova Light" panose="020B0304020202020204" pitchFamily="34" charset="0"/>
-            </a:endParaRPr>
-          </a:p>
-          <a:p>
-            <a:pPr marL="0" indent="0">
-              <a:buNone/>
-            </a:pPr>
-            <a:endParaRPr lang="en-US" i="0" dirty="0">
-              <a:solidFill>
-                <a:srgbClr val="454545"/>
-              </a:solidFill>
-              <a:effectLst/>
-            </a:endParaRPr>
+            <a:endParaRPr lang="es-ES" dirty="0"/>
+          </a:p>
+        </p:txBody>
+      </p:sp>
+      <p:pic>
+        <p:nvPicPr>
+          <p:cNvPr id="7" name="Imagen 6">
+            <a:extLst>
+              <a:ext uri="{FF2B5EF4-FFF2-40B4-BE49-F238E27FC236}">
+                <a16:creationId xmlns:a16="http://schemas.microsoft.com/office/drawing/2014/main" id="{49D00A80-B038-4109-ACFE-73B854E5B2CB}"/>
+              </a:ext>
+            </a:extLst>
+          </p:cNvPr>
+          <p:cNvPicPr>
+            <a:picLocks noChangeAspect="1"/>
+          </p:cNvPicPr>
+          <p:nvPr/>
+        </p:nvPicPr>
+        <p:blipFill>
+          <a:blip r:embed="rId2"/>
+          <a:stretch>
+            <a:fillRect/>
+          </a:stretch>
+        </p:blipFill>
+        <p:spPr>
+          <a:xfrm>
+            <a:off x="181651" y="2887755"/>
+            <a:ext cx="8540318" cy="3025590"/>
+          </a:xfrm>
+          <a:prstGeom prst="rect">
+            <a:avLst/>
+          </a:prstGeom>
+        </p:spPr>
+      </p:pic>
+      <p:sp>
+        <p:nvSpPr>
+          <p:cNvPr id="8" name="Rectángulo: esquinas redondeadas 7">
+            <a:extLst>
+              <a:ext uri="{FF2B5EF4-FFF2-40B4-BE49-F238E27FC236}">
+                <a16:creationId xmlns:a16="http://schemas.microsoft.com/office/drawing/2014/main" id="{533558A4-5C5E-44B0-A097-23234563D5EF}"/>
+              </a:ext>
+            </a:extLst>
+          </p:cNvPr>
+          <p:cNvSpPr/>
+          <p:nvPr/>
+        </p:nvSpPr>
+        <p:spPr>
+          <a:xfrm>
+            <a:off x="1400175" y="3810000"/>
+            <a:ext cx="1000125" cy="552450"/>
+          </a:xfrm>
+          <a:prstGeom prst="roundRect">
+            <a:avLst/>
+          </a:prstGeom>
+          <a:noFill/>
+          <a:ln w="38100">
+            <a:solidFill>
+              <a:srgbClr val="C90026"/>
+            </a:solidFill>
+          </a:ln>
+          <a:effectLst/>
+        </p:spPr>
+        <p:style>
+          <a:lnRef idx="1">
+            <a:schemeClr val="accent1"/>
+          </a:lnRef>
+          <a:fillRef idx="3">
+            <a:schemeClr val="accent1"/>
+          </a:fillRef>
+          <a:effectRef idx="2">
+            <a:schemeClr val="accent1"/>
+          </a:effectRef>
+          <a:fontRef idx="minor">
+            <a:schemeClr val="lt1"/>
+          </a:fontRef>
+        </p:style>
+        <p:txBody>
+          <a:bodyPr rtlCol="0" anchor="ctr"/>
+          <a:lstStyle/>
+          <a:p>
+            <a:pPr algn="ctr"/>
+            <a:endParaRPr lang="es-ES" dirty="0"/>
           </a:p>
         </p:txBody>
       </p:sp>
     </p:spTree>
     <p:extLst>
       <p:ext uri="{BB962C8B-B14F-4D97-AF65-F5344CB8AC3E}">
-        <p14:creationId xmlns:p14="http://schemas.microsoft.com/office/powerpoint/2010/main" val="294936883"/>
+        <p14:creationId xmlns:p14="http://schemas.microsoft.com/office/powerpoint/2010/main" val="537333452"/>
       </p:ext>
     </p:extLst>
   </p:cSld>
@@ -21429,7 +21226,7 @@
           <p:cNvPr id="2" name="Marcador de fecha 1">
             <a:extLst>
               <a:ext uri="{FF2B5EF4-FFF2-40B4-BE49-F238E27FC236}">
-                <a16:creationId xmlns:a16="http://schemas.microsoft.com/office/drawing/2014/main" id="{CE37D71A-0A95-48B6-91F7-6A96CCCEEC45}"/>
+                <a16:creationId xmlns:a16="http://schemas.microsoft.com/office/drawing/2014/main" id="{67C38B27-B5D2-4878-9FDE-1309B3A34182}"/>
               </a:ext>
             </a:extLst>
           </p:cNvPr>
@@ -21448,7 +21245,7 @@
             <a:fld id="{2D72A43D-7419-4C41-A920-C6E38643746D}" type="datetime3">
               <a:rPr lang="es-ES_tradnl" smtClean="0"/>
               <a:pPr/>
-              <a:t>02.01.23</a:t>
+              <a:t>14.02.23</a:t>
             </a:fld>
             <a:endParaRPr lang="en-US" dirty="0"/>
           </a:p>
@@ -21459,7 +21256,7 @@
           <p:cNvPr id="3" name="Marcador de pie de página 2">
             <a:extLst>
               <a:ext uri="{FF2B5EF4-FFF2-40B4-BE49-F238E27FC236}">
-                <a16:creationId xmlns:a16="http://schemas.microsoft.com/office/drawing/2014/main" id="{C65FDD1F-A088-42E9-99D0-10EDE0ED453B}"/>
+                <a16:creationId xmlns:a16="http://schemas.microsoft.com/office/drawing/2014/main" id="{0FF6EDFB-409A-45A2-88C9-462B58D3B128}"/>
               </a:ext>
             </a:extLst>
           </p:cNvPr>
@@ -21477,7 +21274,7 @@
           <a:p>
             <a:r>
               <a:rPr lang="en-US" dirty="0"/>
-              <a:t>Requirements</a:t>
+              <a:t>Writing requirements</a:t>
             </a:r>
           </a:p>
         </p:txBody>
@@ -21487,7 +21284,7 @@
           <p:cNvPr id="4" name="Marcador de número de diapositiva 3">
             <a:extLst>
               <a:ext uri="{FF2B5EF4-FFF2-40B4-BE49-F238E27FC236}">
-                <a16:creationId xmlns:a16="http://schemas.microsoft.com/office/drawing/2014/main" id="{A1F6CFB1-B273-46C4-A51D-9E7A8C23BCFA}"/>
+                <a16:creationId xmlns:a16="http://schemas.microsoft.com/office/drawing/2014/main" id="{07289E42-4DD6-4DFD-A882-9EB73E53FE49}"/>
               </a:ext>
             </a:extLst>
           </p:cNvPr>
@@ -21517,7 +21314,7 @@
           <p:cNvPr id="5" name="Título 4">
             <a:extLst>
               <a:ext uri="{FF2B5EF4-FFF2-40B4-BE49-F238E27FC236}">
-                <a16:creationId xmlns:a16="http://schemas.microsoft.com/office/drawing/2014/main" id="{401EA1E0-7A88-4E73-848C-16262141EDAD}"/>
+                <a16:creationId xmlns:a16="http://schemas.microsoft.com/office/drawing/2014/main" id="{CFDF76CE-01E3-49D7-9942-A8E517BBE6C8}"/>
               </a:ext>
             </a:extLst>
           </p:cNvPr>
@@ -21543,10 +21340,10 @@
       </p:sp>
       <p:sp>
         <p:nvSpPr>
-          <p:cNvPr id="8" name="Marcador de contenido 7">
+          <p:cNvPr id="6" name="Marcador de contenido 5">
             <a:extLst>
               <a:ext uri="{FF2B5EF4-FFF2-40B4-BE49-F238E27FC236}">
-                <a16:creationId xmlns:a16="http://schemas.microsoft.com/office/drawing/2014/main" id="{D3591743-E0F0-4145-AE42-5AB255F302E7}"/>
+                <a16:creationId xmlns:a16="http://schemas.microsoft.com/office/drawing/2014/main" id="{0A6D7239-5A95-4CE6-A732-3A7578AE3A9B}"/>
               </a:ext>
             </a:extLst>
           </p:cNvPr>
@@ -21616,19 +21413,14 @@
             <a:pPr marL="0" indent="0">
               <a:buNone/>
             </a:pPr>
-            <a:endParaRPr lang="en-US" i="0" dirty="0">
-              <a:solidFill>
-                <a:srgbClr val="454545"/>
-              </a:solidFill>
-              <a:effectLst/>
-            </a:endParaRPr>
+            <a:endParaRPr lang="es-ES" dirty="0"/>
           </a:p>
         </p:txBody>
       </p:sp>
     </p:spTree>
     <p:extLst>
       <p:ext uri="{BB962C8B-B14F-4D97-AF65-F5344CB8AC3E}">
-        <p14:creationId xmlns:p14="http://schemas.microsoft.com/office/powerpoint/2010/main" val="533622089"/>
+        <p14:creationId xmlns:p14="http://schemas.microsoft.com/office/powerpoint/2010/main" val="4268002466"/>
       </p:ext>
     </p:extLst>
   </p:cSld>
@@ -21919,7 +21711,7 @@
         </p:nvSpPr>
         <p:spPr>
           <a:xfrm>
-            <a:off x="415783" y="4784254"/>
+            <a:off x="415783" y="4374679"/>
             <a:ext cx="3712873" cy="1758196"/>
           </a:xfrm>
           <a:prstGeom prst="rect">
@@ -22125,13 +21917,8 @@
           <a:p>
             <a:r>
               <a:rPr lang="es-ES" b="1" dirty="0"/>
-              <a:t>Jon del </a:t>
-            </a:r>
-            <a:r>
-              <a:rPr lang="es-ES" b="1"/>
-              <a:t>Olmo Larrañaga</a:t>
-            </a:r>
-            <a:endParaRPr lang="es-ES" b="1" dirty="0"/>
+              <a:t>Jon del Olmo Larrañaga</a:t>
+            </a:r>
           </a:p>
           <a:p>
             <a:r>
@@ -22147,12 +21934,30 @@
           </a:p>
           <a:p>
             <a:r>
-              <a:rPr lang="es-ES" sz="1100" dirty="0" err="1"/>
-              <a:t>Orona</a:t>
-            </a:r>
+              <a:rPr lang="es-ES" sz="1400" b="1" dirty="0" err="1"/>
+              <a:t>Iosu</a:t>
+            </a:r>
+            <a:r>
+              <a:rPr lang="es-ES" sz="1400" b="1" dirty="0"/>
+              <a:t> Aizpuru</a:t>
+            </a:r>
+          </a:p>
+          <a:p>
+            <a:r>
+              <a:rPr lang="es-ES" sz="800" dirty="0">
+                <a:hlinkClick r:id="rId2"/>
+              </a:rPr>
+              <a:t>iaizpuru@mondragon.edu</a:t>
+            </a:r>
+            <a:endParaRPr lang="es-ES" sz="800" dirty="0"/>
+          </a:p>
+          <a:p>
+            <a:endParaRPr lang="es-ES" sz="1100" dirty="0"/>
+          </a:p>
+          <a:p>
             <a:r>
               <a:rPr lang="es-ES" sz="1100" dirty="0"/>
-              <a:t> Ideo - </a:t>
+              <a:t>Orona Ideo - </a:t>
             </a:r>
             <a:r>
               <a:rPr lang="es-ES" sz="1100" dirty="0" err="1"/>
@@ -22255,12 +22060,7 @@
             <p:ph type="title"/>
           </p:nvPr>
         </p:nvSpPr>
-        <p:spPr>
-          <a:xfrm>
-            <a:off x="2388109" y="2754427"/>
-            <a:ext cx="3847227" cy="1362075"/>
-          </a:xfrm>
-        </p:spPr>
+        <p:spPr/>
         <p:txBody>
           <a:bodyPr>
             <a:normAutofit/>
@@ -22271,6 +22071,31 @@
               <a:rPr lang="en-US" dirty="0"/>
               <a:t>Properties of requirements</a:t>
             </a:r>
+          </a:p>
+        </p:txBody>
+      </p:sp>
+      <p:sp>
+        <p:nvSpPr>
+          <p:cNvPr id="2" name="Marcador de texto 1">
+            <a:extLst>
+              <a:ext uri="{FF2B5EF4-FFF2-40B4-BE49-F238E27FC236}">
+                <a16:creationId xmlns:a16="http://schemas.microsoft.com/office/drawing/2014/main" id="{8AA1E600-F5A4-4A51-916D-82E89A9090E3}"/>
+              </a:ext>
+            </a:extLst>
+          </p:cNvPr>
+          <p:cNvSpPr>
+            <a:spLocks noGrp="1"/>
+          </p:cNvSpPr>
+          <p:nvPr>
+            <p:ph type="body" idx="1"/>
+          </p:nvPr>
+        </p:nvSpPr>
+        <p:spPr/>
+        <p:txBody>
+          <a:bodyPr/>
+          <a:lstStyle/>
+          <a:p>
+            <a:endParaRPr lang="es-ES"/>
           </a:p>
         </p:txBody>
       </p:sp>
@@ -22331,7 +22156,7 @@
           <p:cNvPr id="2" name="Marcador de fecha 1">
             <a:extLst>
               <a:ext uri="{FF2B5EF4-FFF2-40B4-BE49-F238E27FC236}">
-                <a16:creationId xmlns:a16="http://schemas.microsoft.com/office/drawing/2014/main" id="{CE37D71A-0A95-48B6-91F7-6A96CCCEEC45}"/>
+                <a16:creationId xmlns:a16="http://schemas.microsoft.com/office/drawing/2014/main" id="{E20AA9FE-B2AA-48D4-AE74-9283E7DD33F4}"/>
               </a:ext>
             </a:extLst>
           </p:cNvPr>
@@ -22350,7 +22175,7 @@
             <a:fld id="{2D72A43D-7419-4C41-A920-C6E38643746D}" type="datetime3">
               <a:rPr lang="es-ES_tradnl" smtClean="0"/>
               <a:pPr/>
-              <a:t>02.01.23</a:t>
+              <a:t>14.02.23</a:t>
             </a:fld>
             <a:endParaRPr lang="en-US" dirty="0"/>
           </a:p>
@@ -22361,7 +22186,7 @@
           <p:cNvPr id="3" name="Marcador de pie de página 2">
             <a:extLst>
               <a:ext uri="{FF2B5EF4-FFF2-40B4-BE49-F238E27FC236}">
-                <a16:creationId xmlns:a16="http://schemas.microsoft.com/office/drawing/2014/main" id="{C65FDD1F-A088-42E9-99D0-10EDE0ED453B}"/>
+                <a16:creationId xmlns:a16="http://schemas.microsoft.com/office/drawing/2014/main" id="{E37B6FE8-93CF-4FA1-A7BD-56B168EE37D9}"/>
               </a:ext>
             </a:extLst>
           </p:cNvPr>
@@ -22379,7 +22204,7 @@
           <a:p>
             <a:r>
               <a:rPr lang="en-US" dirty="0"/>
-              <a:t>Requirements</a:t>
+              <a:t>Writing requirements</a:t>
             </a:r>
           </a:p>
         </p:txBody>
@@ -22389,7 +22214,7 @@
           <p:cNvPr id="4" name="Marcador de número de diapositiva 3">
             <a:extLst>
               <a:ext uri="{FF2B5EF4-FFF2-40B4-BE49-F238E27FC236}">
-                <a16:creationId xmlns:a16="http://schemas.microsoft.com/office/drawing/2014/main" id="{A1F6CFB1-B273-46C4-A51D-9E7A8C23BCFA}"/>
+                <a16:creationId xmlns:a16="http://schemas.microsoft.com/office/drawing/2014/main" id="{A7FF1D07-1935-42DA-BC09-44780A7B0BFB}"/>
               </a:ext>
             </a:extLst>
           </p:cNvPr>
@@ -22419,7 +22244,7 @@
           <p:cNvPr id="5" name="Título 4">
             <a:extLst>
               <a:ext uri="{FF2B5EF4-FFF2-40B4-BE49-F238E27FC236}">
-                <a16:creationId xmlns:a16="http://schemas.microsoft.com/office/drawing/2014/main" id="{401EA1E0-7A88-4E73-848C-16262141EDAD}"/>
+                <a16:creationId xmlns:a16="http://schemas.microsoft.com/office/drawing/2014/main" id="{AF709576-974B-4E0A-AD6F-3C135846419A}"/>
               </a:ext>
             </a:extLst>
           </p:cNvPr>
@@ -22453,10 +22278,10 @@
       </p:sp>
       <p:sp>
         <p:nvSpPr>
-          <p:cNvPr id="8" name="Marcador de contenido 7">
+          <p:cNvPr id="6" name="Marcador de contenido 5">
             <a:extLst>
               <a:ext uri="{FF2B5EF4-FFF2-40B4-BE49-F238E27FC236}">
-                <a16:creationId xmlns:a16="http://schemas.microsoft.com/office/drawing/2014/main" id="{D3591743-E0F0-4145-AE42-5AB255F302E7}"/>
+                <a16:creationId xmlns:a16="http://schemas.microsoft.com/office/drawing/2014/main" id="{D700C7E2-D3F1-4A4D-80AD-9640139B4822}"/>
               </a:ext>
             </a:extLst>
           </p:cNvPr>
@@ -22548,35 +22373,14 @@
             </a:r>
           </a:p>
           <a:p>
-            <a:pPr>
-              <a:buFont typeface="+mj-lt"/>
-              <a:buAutoNum type="arabicPeriod"/>
-            </a:pPr>
-            <a:endParaRPr lang="en-US" i="0" dirty="0">
-              <a:solidFill>
-                <a:schemeClr val="tx1"/>
-              </a:solidFill>
-              <a:effectLst/>
-              <a:latin typeface="Arial Nova Light" panose="020B0304020202020204" pitchFamily="34" charset="0"/>
-            </a:endParaRPr>
-          </a:p>
-          <a:p>
-            <a:pPr marL="0" indent="0">
-              <a:buNone/>
-            </a:pPr>
-            <a:endParaRPr lang="en-US" i="0" dirty="0">
-              <a:solidFill>
-                <a:srgbClr val="454545"/>
-              </a:solidFill>
-              <a:effectLst/>
-            </a:endParaRPr>
+            <a:endParaRPr lang="es-ES" dirty="0"/>
           </a:p>
         </p:txBody>
       </p:sp>
     </p:spTree>
     <p:extLst>
       <p:ext uri="{BB962C8B-B14F-4D97-AF65-F5344CB8AC3E}">
-        <p14:creationId xmlns:p14="http://schemas.microsoft.com/office/powerpoint/2010/main" val="18350544"/>
+        <p14:creationId xmlns:p14="http://schemas.microsoft.com/office/powerpoint/2010/main" val="3694331737"/>
       </p:ext>
     </p:extLst>
   </p:cSld>
@@ -22608,7 +22412,7 @@
           <p:cNvPr id="2" name="Marcador de fecha 1">
             <a:extLst>
               <a:ext uri="{FF2B5EF4-FFF2-40B4-BE49-F238E27FC236}">
-                <a16:creationId xmlns:a16="http://schemas.microsoft.com/office/drawing/2014/main" id="{CE37D71A-0A95-48B6-91F7-6A96CCCEEC45}"/>
+                <a16:creationId xmlns:a16="http://schemas.microsoft.com/office/drawing/2014/main" id="{E20AA9FE-B2AA-48D4-AE74-9283E7DD33F4}"/>
               </a:ext>
             </a:extLst>
           </p:cNvPr>
@@ -22627,7 +22431,7 @@
             <a:fld id="{2D72A43D-7419-4C41-A920-C6E38643746D}" type="datetime3">
               <a:rPr lang="es-ES_tradnl" smtClean="0"/>
               <a:pPr/>
-              <a:t>02.01.23</a:t>
+              <a:t>14.02.23</a:t>
             </a:fld>
             <a:endParaRPr lang="en-US" dirty="0"/>
           </a:p>
@@ -22638,7 +22442,7 @@
           <p:cNvPr id="3" name="Marcador de pie de página 2">
             <a:extLst>
               <a:ext uri="{FF2B5EF4-FFF2-40B4-BE49-F238E27FC236}">
-                <a16:creationId xmlns:a16="http://schemas.microsoft.com/office/drawing/2014/main" id="{C65FDD1F-A088-42E9-99D0-10EDE0ED453B}"/>
+                <a16:creationId xmlns:a16="http://schemas.microsoft.com/office/drawing/2014/main" id="{E37B6FE8-93CF-4FA1-A7BD-56B168EE37D9}"/>
               </a:ext>
             </a:extLst>
           </p:cNvPr>
@@ -22656,7 +22460,7 @@
           <a:p>
             <a:r>
               <a:rPr lang="en-US" dirty="0"/>
-              <a:t>Requirements</a:t>
+              <a:t>Writing requirements</a:t>
             </a:r>
           </a:p>
         </p:txBody>
@@ -22666,7 +22470,7 @@
           <p:cNvPr id="4" name="Marcador de número de diapositiva 3">
             <a:extLst>
               <a:ext uri="{FF2B5EF4-FFF2-40B4-BE49-F238E27FC236}">
-                <a16:creationId xmlns:a16="http://schemas.microsoft.com/office/drawing/2014/main" id="{A1F6CFB1-B273-46C4-A51D-9E7A8C23BCFA}"/>
+                <a16:creationId xmlns:a16="http://schemas.microsoft.com/office/drawing/2014/main" id="{A7FF1D07-1935-42DA-BC09-44780A7B0BFB}"/>
               </a:ext>
             </a:extLst>
           </p:cNvPr>
@@ -22696,7 +22500,7 @@
           <p:cNvPr id="5" name="Título 4">
             <a:extLst>
               <a:ext uri="{FF2B5EF4-FFF2-40B4-BE49-F238E27FC236}">
-                <a16:creationId xmlns:a16="http://schemas.microsoft.com/office/drawing/2014/main" id="{401EA1E0-7A88-4E73-848C-16262141EDAD}"/>
+                <a16:creationId xmlns:a16="http://schemas.microsoft.com/office/drawing/2014/main" id="{AF709576-974B-4E0A-AD6F-3C135846419A}"/>
               </a:ext>
             </a:extLst>
           </p:cNvPr>
@@ -22730,10 +22534,10 @@
       </p:sp>
       <p:sp>
         <p:nvSpPr>
-          <p:cNvPr id="8" name="Marcador de contenido 7">
+          <p:cNvPr id="6" name="Marcador de contenido 5">
             <a:extLst>
               <a:ext uri="{FF2B5EF4-FFF2-40B4-BE49-F238E27FC236}">
-                <a16:creationId xmlns:a16="http://schemas.microsoft.com/office/drawing/2014/main" id="{D3591743-E0F0-4145-AE42-5AB255F302E7}"/>
+                <a16:creationId xmlns:a16="http://schemas.microsoft.com/office/drawing/2014/main" id="{D700C7E2-D3F1-4A4D-80AD-9640139B4822}"/>
               </a:ext>
             </a:extLst>
           </p:cNvPr>
@@ -22746,9 +22550,7 @@
         </p:nvSpPr>
         <p:spPr/>
         <p:txBody>
-          <a:bodyPr>
-            <a:normAutofit/>
-          </a:bodyPr>
+          <a:bodyPr/>
           <a:lstStyle/>
           <a:p>
             <a:pPr marL="0" indent="0">
@@ -22906,43 +22708,14 @@
             </a:r>
           </a:p>
           <a:p>
-            <a:endParaRPr lang="en-US" dirty="0">
-              <a:solidFill>
-                <a:schemeClr val="tx1"/>
-              </a:solidFill>
-              <a:latin typeface="Arial Nova Light" panose="020B0304020202020204" pitchFamily="34" charset="0"/>
-            </a:endParaRPr>
-          </a:p>
-          <a:p>
-            <a:pPr>
-              <a:buFont typeface="+mj-lt"/>
-              <a:buAutoNum type="arabicPeriod"/>
-            </a:pPr>
-            <a:endParaRPr lang="en-US" i="0" dirty="0">
-              <a:solidFill>
-                <a:schemeClr val="tx1"/>
-              </a:solidFill>
-              <a:effectLst/>
-              <a:latin typeface="Arial Nova Light" panose="020B0304020202020204" pitchFamily="34" charset="0"/>
-            </a:endParaRPr>
-          </a:p>
-          <a:p>
-            <a:pPr marL="0" indent="0">
-              <a:buNone/>
-            </a:pPr>
-            <a:endParaRPr lang="en-US" i="0" dirty="0">
-              <a:solidFill>
-                <a:srgbClr val="454545"/>
-              </a:solidFill>
-              <a:effectLst/>
-            </a:endParaRPr>
+            <a:endParaRPr lang="es-ES" dirty="0"/>
           </a:p>
         </p:txBody>
       </p:sp>
     </p:spTree>
     <p:extLst>
       <p:ext uri="{BB962C8B-B14F-4D97-AF65-F5344CB8AC3E}">
-        <p14:creationId xmlns:p14="http://schemas.microsoft.com/office/powerpoint/2010/main" val="2171749911"/>
+        <p14:creationId xmlns:p14="http://schemas.microsoft.com/office/powerpoint/2010/main" val="302163213"/>
       </p:ext>
     </p:extLst>
   </p:cSld>
@@ -22974,7 +22747,7 @@
           <p:cNvPr id="2" name="Marcador de fecha 1">
             <a:extLst>
               <a:ext uri="{FF2B5EF4-FFF2-40B4-BE49-F238E27FC236}">
-                <a16:creationId xmlns:a16="http://schemas.microsoft.com/office/drawing/2014/main" id="{CE37D71A-0A95-48B6-91F7-6A96CCCEEC45}"/>
+                <a16:creationId xmlns:a16="http://schemas.microsoft.com/office/drawing/2014/main" id="{AB225835-F0A3-40C9-ABE5-7C89F81ED39E}"/>
               </a:ext>
             </a:extLst>
           </p:cNvPr>
@@ -22993,7 +22766,7 @@
             <a:fld id="{2D72A43D-7419-4C41-A920-C6E38643746D}" type="datetime3">
               <a:rPr lang="es-ES_tradnl" smtClean="0"/>
               <a:pPr/>
-              <a:t>02.01.23</a:t>
+              <a:t>14.02.23</a:t>
             </a:fld>
             <a:endParaRPr lang="en-US" dirty="0"/>
           </a:p>
@@ -23004,7 +22777,7 @@
           <p:cNvPr id="3" name="Marcador de pie de página 2">
             <a:extLst>
               <a:ext uri="{FF2B5EF4-FFF2-40B4-BE49-F238E27FC236}">
-                <a16:creationId xmlns:a16="http://schemas.microsoft.com/office/drawing/2014/main" id="{C65FDD1F-A088-42E9-99D0-10EDE0ED453B}"/>
+                <a16:creationId xmlns:a16="http://schemas.microsoft.com/office/drawing/2014/main" id="{514A6FFE-EB88-46DA-B5EE-14D5F79036E6}"/>
               </a:ext>
             </a:extLst>
           </p:cNvPr>
@@ -23022,7 +22795,7 @@
           <a:p>
             <a:r>
               <a:rPr lang="en-US" dirty="0"/>
-              <a:t>Requirements</a:t>
+              <a:t>Writing requirements</a:t>
             </a:r>
           </a:p>
         </p:txBody>
@@ -23032,7 +22805,7 @@
           <p:cNvPr id="4" name="Marcador de número de diapositiva 3">
             <a:extLst>
               <a:ext uri="{FF2B5EF4-FFF2-40B4-BE49-F238E27FC236}">
-                <a16:creationId xmlns:a16="http://schemas.microsoft.com/office/drawing/2014/main" id="{A1F6CFB1-B273-46C4-A51D-9E7A8C23BCFA}"/>
+                <a16:creationId xmlns:a16="http://schemas.microsoft.com/office/drawing/2014/main" id="{D327CCC6-54DD-4126-893D-85C82F694212}"/>
               </a:ext>
             </a:extLst>
           </p:cNvPr>
@@ -23062,7 +22835,7 @@
           <p:cNvPr id="5" name="Título 4">
             <a:extLst>
               <a:ext uri="{FF2B5EF4-FFF2-40B4-BE49-F238E27FC236}">
-                <a16:creationId xmlns:a16="http://schemas.microsoft.com/office/drawing/2014/main" id="{401EA1E0-7A88-4E73-848C-16262141EDAD}"/>
+                <a16:creationId xmlns:a16="http://schemas.microsoft.com/office/drawing/2014/main" id="{F6B44A24-A1F0-4A90-889E-E628F56FD195}"/>
               </a:ext>
             </a:extLst>
           </p:cNvPr>
@@ -23096,10 +22869,10 @@
       </p:sp>
       <p:sp>
         <p:nvSpPr>
-          <p:cNvPr id="8" name="Marcador de contenido 7">
+          <p:cNvPr id="6" name="Marcador de contenido 5">
             <a:extLst>
               <a:ext uri="{FF2B5EF4-FFF2-40B4-BE49-F238E27FC236}">
-                <a16:creationId xmlns:a16="http://schemas.microsoft.com/office/drawing/2014/main" id="{D3591743-E0F0-4145-AE42-5AB255F302E7}"/>
+                <a16:creationId xmlns:a16="http://schemas.microsoft.com/office/drawing/2014/main" id="{9D3BA1D7-B35F-4F55-A1DA-D8D8D8CC56D5}"/>
               </a:ext>
             </a:extLst>
           </p:cNvPr>
@@ -23112,9 +22885,7 @@
         </p:nvSpPr>
         <p:spPr/>
         <p:txBody>
-          <a:bodyPr>
-            <a:normAutofit/>
-          </a:bodyPr>
+          <a:bodyPr/>
           <a:lstStyle/>
           <a:p>
             <a:pPr marL="0" indent="0">
@@ -23167,36 +22938,7 @@
             </a:r>
           </a:p>
           <a:p>
-            <a:endParaRPr lang="en-US" dirty="0">
-              <a:solidFill>
-                <a:schemeClr val="tx1"/>
-              </a:solidFill>
-              <a:latin typeface="Arial Nova Light" panose="020B0304020202020204" pitchFamily="34" charset="0"/>
-            </a:endParaRPr>
-          </a:p>
-          <a:p>
-            <a:pPr>
-              <a:buFont typeface="+mj-lt"/>
-              <a:buAutoNum type="arabicPeriod"/>
-            </a:pPr>
-            <a:endParaRPr lang="en-US" i="0" dirty="0">
-              <a:solidFill>
-                <a:schemeClr val="tx1"/>
-              </a:solidFill>
-              <a:effectLst/>
-              <a:latin typeface="Arial Nova Light" panose="020B0304020202020204" pitchFamily="34" charset="0"/>
-            </a:endParaRPr>
-          </a:p>
-          <a:p>
-            <a:pPr marL="0" indent="0">
-              <a:buNone/>
-            </a:pPr>
-            <a:endParaRPr lang="en-US" i="0" dirty="0">
-              <a:solidFill>
-                <a:srgbClr val="454545"/>
-              </a:solidFill>
-              <a:effectLst/>
-            </a:endParaRPr>
+            <a:endParaRPr lang="es-ES" dirty="0"/>
           </a:p>
         </p:txBody>
       </p:sp>
@@ -23205,7 +22947,7 @@
           <p:cNvPr id="9" name="CuadroTexto 8">
             <a:extLst>
               <a:ext uri="{FF2B5EF4-FFF2-40B4-BE49-F238E27FC236}">
-                <a16:creationId xmlns:a16="http://schemas.microsoft.com/office/drawing/2014/main" id="{F8C716B0-166C-469D-8C08-78D785DC7FA7}"/>
+                <a16:creationId xmlns:a16="http://schemas.microsoft.com/office/drawing/2014/main" id="{90638A71-1C97-4384-9A64-237059D9009E}"/>
               </a:ext>
             </a:extLst>
           </p:cNvPr>
@@ -23241,7 +22983,7 @@
     </p:spTree>
     <p:extLst>
       <p:ext uri="{BB962C8B-B14F-4D97-AF65-F5344CB8AC3E}">
-        <p14:creationId xmlns:p14="http://schemas.microsoft.com/office/powerpoint/2010/main" val="2250658417"/>
+        <p14:creationId xmlns:p14="http://schemas.microsoft.com/office/powerpoint/2010/main" val="3965112336"/>
       </p:ext>
     </p:extLst>
   </p:cSld>
@@ -23273,7 +23015,7 @@
           <p:cNvPr id="2" name="Marcador de fecha 1">
             <a:extLst>
               <a:ext uri="{FF2B5EF4-FFF2-40B4-BE49-F238E27FC236}">
-                <a16:creationId xmlns:a16="http://schemas.microsoft.com/office/drawing/2014/main" id="{CE37D71A-0A95-48B6-91F7-6A96CCCEEC45}"/>
+                <a16:creationId xmlns:a16="http://schemas.microsoft.com/office/drawing/2014/main" id="{F2B7E36C-ACFF-4CDC-A5B8-8A04ABB29177}"/>
               </a:ext>
             </a:extLst>
           </p:cNvPr>
@@ -23292,7 +23034,7 @@
             <a:fld id="{2D72A43D-7419-4C41-A920-C6E38643746D}" type="datetime3">
               <a:rPr lang="es-ES_tradnl" smtClean="0"/>
               <a:pPr/>
-              <a:t>02.01.23</a:t>
+              <a:t>14.02.23</a:t>
             </a:fld>
             <a:endParaRPr lang="en-US" dirty="0"/>
           </a:p>
@@ -23303,7 +23045,7 @@
           <p:cNvPr id="3" name="Marcador de pie de página 2">
             <a:extLst>
               <a:ext uri="{FF2B5EF4-FFF2-40B4-BE49-F238E27FC236}">
-                <a16:creationId xmlns:a16="http://schemas.microsoft.com/office/drawing/2014/main" id="{C65FDD1F-A088-42E9-99D0-10EDE0ED453B}"/>
+                <a16:creationId xmlns:a16="http://schemas.microsoft.com/office/drawing/2014/main" id="{29B37935-1B52-4FAC-9A72-687D6F404DE2}"/>
               </a:ext>
             </a:extLst>
           </p:cNvPr>
@@ -23321,7 +23063,7 @@
           <a:p>
             <a:r>
               <a:rPr lang="en-US" dirty="0"/>
-              <a:t>Requirements</a:t>
+              <a:t>Writing requirements</a:t>
             </a:r>
           </a:p>
         </p:txBody>
@@ -23331,7 +23073,7 @@
           <p:cNvPr id="4" name="Marcador de número de diapositiva 3">
             <a:extLst>
               <a:ext uri="{FF2B5EF4-FFF2-40B4-BE49-F238E27FC236}">
-                <a16:creationId xmlns:a16="http://schemas.microsoft.com/office/drawing/2014/main" id="{A1F6CFB1-B273-46C4-A51D-9E7A8C23BCFA}"/>
+                <a16:creationId xmlns:a16="http://schemas.microsoft.com/office/drawing/2014/main" id="{B0BB6DB2-C900-4E7D-BA6F-6E26025B778E}"/>
               </a:ext>
             </a:extLst>
           </p:cNvPr>
@@ -23361,7 +23103,7 @@
           <p:cNvPr id="5" name="Título 4">
             <a:extLst>
               <a:ext uri="{FF2B5EF4-FFF2-40B4-BE49-F238E27FC236}">
-                <a16:creationId xmlns:a16="http://schemas.microsoft.com/office/drawing/2014/main" id="{401EA1E0-7A88-4E73-848C-16262141EDAD}"/>
+                <a16:creationId xmlns:a16="http://schemas.microsoft.com/office/drawing/2014/main" id="{6694AD00-0A99-471B-9014-6203065432E6}"/>
               </a:ext>
             </a:extLst>
           </p:cNvPr>
@@ -23385,9 +23127,341 @@
           </a:p>
         </p:txBody>
       </p:sp>
+      <p:sp>
+        <p:nvSpPr>
+          <p:cNvPr id="7" name="CuadroTexto 6">
+            <a:extLst>
+              <a:ext uri="{FF2B5EF4-FFF2-40B4-BE49-F238E27FC236}">
+                <a16:creationId xmlns:a16="http://schemas.microsoft.com/office/drawing/2014/main" id="{BD2BA44C-75E1-4B9C-948E-8447076E557F}"/>
+              </a:ext>
+            </a:extLst>
+          </p:cNvPr>
+          <p:cNvSpPr txBox="1"/>
+          <p:nvPr/>
+        </p:nvSpPr>
+        <p:spPr>
+          <a:xfrm>
+            <a:off x="3253154" y="1380364"/>
+            <a:ext cx="5099538" cy="307777"/>
+          </a:xfrm>
+          <a:prstGeom prst="rect">
+            <a:avLst/>
+          </a:prstGeom>
+          <a:noFill/>
+        </p:spPr>
+        <p:txBody>
+          <a:bodyPr wrap="square">
+            <a:spAutoFit/>
+          </a:bodyPr>
+          <a:lstStyle/>
+          <a:p>
+            <a:r>
+              <a:rPr lang="en-US" sz="1400" dirty="0">
+                <a:latin typeface="Arial Nova Light" panose="020B0304020202020204" pitchFamily="34" charset="0"/>
+              </a:rPr>
+              <a:t>T</a:t>
+            </a:r>
+            <a:r>
+              <a:rPr lang="en-US" sz="1400" b="0" i="0" u="none" strike="noStrike" baseline="0" dirty="0">
+                <a:latin typeface="Arial Nova Light" panose="020B0304020202020204" pitchFamily="34" charset="0"/>
+              </a:rPr>
+              <a:t>echnically possible (cost and schedule).</a:t>
+            </a:r>
+            <a:endParaRPr lang="es-ES" sz="1400" dirty="0">
+              <a:latin typeface="Arial Nova Light" panose="020B0304020202020204" pitchFamily="34" charset="0"/>
+            </a:endParaRPr>
+          </a:p>
+        </p:txBody>
+      </p:sp>
+      <p:sp>
+        <p:nvSpPr>
+          <p:cNvPr id="8" name="CuadroTexto 7">
+            <a:extLst>
+              <a:ext uri="{FF2B5EF4-FFF2-40B4-BE49-F238E27FC236}">
+                <a16:creationId xmlns:a16="http://schemas.microsoft.com/office/drawing/2014/main" id="{D389E8FC-9672-43A2-8967-666E3968F7D6}"/>
+              </a:ext>
+            </a:extLst>
+          </p:cNvPr>
+          <p:cNvSpPr txBox="1"/>
+          <p:nvPr/>
+        </p:nvSpPr>
+        <p:spPr>
+          <a:xfrm>
+            <a:off x="3253154" y="1896725"/>
+            <a:ext cx="5099538" cy="523220"/>
+          </a:xfrm>
+          <a:prstGeom prst="rect">
+            <a:avLst/>
+          </a:prstGeom>
+          <a:noFill/>
+        </p:spPr>
+        <p:txBody>
+          <a:bodyPr wrap="square">
+            <a:spAutoFit/>
+          </a:bodyPr>
+          <a:lstStyle/>
+          <a:p>
+            <a:r>
+              <a:rPr lang="en-US" sz="1400" dirty="0">
+                <a:latin typeface="Arial Nova Light" panose="020B0304020202020204" pitchFamily="34" charset="0"/>
+              </a:rPr>
+              <a:t>Each statement can be tested. There is a feasible procedure to do so.</a:t>
+            </a:r>
+            <a:endParaRPr lang="es-ES" sz="1400" dirty="0">
+              <a:latin typeface="Arial Nova Light" panose="020B0304020202020204" pitchFamily="34" charset="0"/>
+            </a:endParaRPr>
+          </a:p>
+        </p:txBody>
+      </p:sp>
+      <p:sp>
+        <p:nvSpPr>
+          <p:cNvPr id="9" name="CuadroTexto 8">
+            <a:extLst>
+              <a:ext uri="{FF2B5EF4-FFF2-40B4-BE49-F238E27FC236}">
+                <a16:creationId xmlns:a16="http://schemas.microsoft.com/office/drawing/2014/main" id="{4169CD57-BCB1-4A21-8ACE-BFF7B2FDD069}"/>
+              </a:ext>
+            </a:extLst>
+          </p:cNvPr>
+          <p:cNvSpPr txBox="1"/>
+          <p:nvPr/>
+        </p:nvSpPr>
+        <p:spPr>
+          <a:xfrm>
+            <a:off x="3253154" y="2607229"/>
+            <a:ext cx="5890846" cy="523220"/>
+          </a:xfrm>
+          <a:prstGeom prst="rect">
+            <a:avLst/>
+          </a:prstGeom>
+          <a:noFill/>
+        </p:spPr>
+        <p:txBody>
+          <a:bodyPr wrap="square">
+            <a:spAutoFit/>
+          </a:bodyPr>
+          <a:lstStyle/>
+          <a:p>
+            <a:r>
+              <a:rPr lang="en-US" sz="1400" dirty="0">
+                <a:latin typeface="Arial Nova Light" panose="020B0304020202020204" pitchFamily="34" charset="0"/>
+              </a:rPr>
+              <a:t>Each statement is precise, there are no ambiguities. There is only one interpretation.</a:t>
+            </a:r>
+            <a:endParaRPr lang="es-ES" sz="1400" dirty="0">
+              <a:latin typeface="Arial Nova Light" panose="020B0304020202020204" pitchFamily="34" charset="0"/>
+            </a:endParaRPr>
+          </a:p>
+        </p:txBody>
+      </p:sp>
+      <p:sp>
+        <p:nvSpPr>
+          <p:cNvPr id="10" name="CuadroTexto 9">
+            <a:extLst>
+              <a:ext uri="{FF2B5EF4-FFF2-40B4-BE49-F238E27FC236}">
+                <a16:creationId xmlns:a16="http://schemas.microsoft.com/office/drawing/2014/main" id="{FC07F115-83B6-4879-BD61-DE447718FEEF}"/>
+              </a:ext>
+            </a:extLst>
+          </p:cNvPr>
+          <p:cNvSpPr txBox="1"/>
+          <p:nvPr/>
+        </p:nvSpPr>
+        <p:spPr>
+          <a:xfrm>
+            <a:off x="3253154" y="3132222"/>
+            <a:ext cx="5099538" cy="523220"/>
+          </a:xfrm>
+          <a:prstGeom prst="rect">
+            <a:avLst/>
+          </a:prstGeom>
+          <a:noFill/>
+        </p:spPr>
+        <p:txBody>
+          <a:bodyPr wrap="square">
+            <a:spAutoFit/>
+          </a:bodyPr>
+          <a:lstStyle/>
+          <a:p>
+            <a:r>
+              <a:rPr lang="en-US" sz="1400" dirty="0">
+                <a:latin typeface="Arial Nova Light" panose="020B0304020202020204" pitchFamily="34" charset="0"/>
+              </a:rPr>
+              <a:t>Each statement can be understood. There are not spelling or other kind of mistakes.</a:t>
+            </a:r>
+            <a:endParaRPr lang="es-ES" sz="1400" dirty="0">
+              <a:latin typeface="Arial Nova Light" panose="020B0304020202020204" pitchFamily="34" charset="0"/>
+            </a:endParaRPr>
+          </a:p>
+        </p:txBody>
+      </p:sp>
+      <p:sp>
+        <p:nvSpPr>
+          <p:cNvPr id="11" name="CuadroTexto 10">
+            <a:extLst>
+              <a:ext uri="{FF2B5EF4-FFF2-40B4-BE49-F238E27FC236}">
+                <a16:creationId xmlns:a16="http://schemas.microsoft.com/office/drawing/2014/main" id="{52917B78-047F-46C0-A003-DE4FE76AA897}"/>
+              </a:ext>
+            </a:extLst>
+          </p:cNvPr>
+          <p:cNvSpPr txBox="1"/>
+          <p:nvPr/>
+        </p:nvSpPr>
+        <p:spPr>
+          <a:xfrm>
+            <a:off x="3253154" y="3855883"/>
+            <a:ext cx="5099538" cy="307777"/>
+          </a:xfrm>
+          <a:prstGeom prst="rect">
+            <a:avLst/>
+          </a:prstGeom>
+          <a:noFill/>
+        </p:spPr>
+        <p:txBody>
+          <a:bodyPr wrap="square">
+            <a:spAutoFit/>
+          </a:bodyPr>
+          <a:lstStyle/>
+          <a:p>
+            <a:r>
+              <a:rPr lang="en-US" sz="1400" dirty="0">
+                <a:latin typeface="Arial Nova Light" panose="020B0304020202020204" pitchFamily="34" charset="0"/>
+              </a:rPr>
+              <a:t>The requirement defines a single traceable element.</a:t>
+            </a:r>
+            <a:endParaRPr lang="es-ES" sz="1400" dirty="0">
+              <a:latin typeface="Arial Nova Light" panose="020B0304020202020204" pitchFamily="34" charset="0"/>
+            </a:endParaRPr>
+          </a:p>
+        </p:txBody>
+      </p:sp>
+      <p:sp>
+        <p:nvSpPr>
+          <p:cNvPr id="12" name="CuadroTexto 11">
+            <a:extLst>
+              <a:ext uri="{FF2B5EF4-FFF2-40B4-BE49-F238E27FC236}">
+                <a16:creationId xmlns:a16="http://schemas.microsoft.com/office/drawing/2014/main" id="{E1889B01-08BA-49EC-9FF7-9AFC8C38F5DF}"/>
+              </a:ext>
+            </a:extLst>
+          </p:cNvPr>
+          <p:cNvSpPr txBox="1"/>
+          <p:nvPr/>
+        </p:nvSpPr>
+        <p:spPr>
+          <a:xfrm>
+            <a:off x="3253154" y="4442430"/>
+            <a:ext cx="5099538" cy="307777"/>
+          </a:xfrm>
+          <a:prstGeom prst="rect">
+            <a:avLst/>
+          </a:prstGeom>
+          <a:noFill/>
+        </p:spPr>
+        <p:txBody>
+          <a:bodyPr wrap="square">
+            <a:spAutoFit/>
+          </a:bodyPr>
+          <a:lstStyle/>
+          <a:p>
+            <a:r>
+              <a:rPr lang="en-US" sz="1400" dirty="0">
+                <a:latin typeface="Arial Nova Light" panose="020B0304020202020204" pitchFamily="34" charset="0"/>
+              </a:rPr>
+              <a:t>Does not make you break any law.</a:t>
+            </a:r>
+            <a:endParaRPr lang="es-ES" sz="1400" dirty="0">
+              <a:latin typeface="Arial Nova Light" panose="020B0304020202020204" pitchFamily="34" charset="0"/>
+            </a:endParaRPr>
+          </a:p>
+        </p:txBody>
+      </p:sp>
+      <p:sp>
+        <p:nvSpPr>
+          <p:cNvPr id="13" name="CuadroTexto 12">
+            <a:extLst>
+              <a:ext uri="{FF2B5EF4-FFF2-40B4-BE49-F238E27FC236}">
+                <a16:creationId xmlns:a16="http://schemas.microsoft.com/office/drawing/2014/main" id="{254462B2-8DE4-48D2-88AB-2D32E0C32B54}"/>
+              </a:ext>
+            </a:extLst>
+          </p:cNvPr>
+          <p:cNvSpPr txBox="1"/>
+          <p:nvPr/>
+        </p:nvSpPr>
+        <p:spPr>
+          <a:xfrm>
+            <a:off x="3253154" y="4954416"/>
+            <a:ext cx="5099538" cy="523220"/>
+          </a:xfrm>
+          <a:prstGeom prst="rect">
+            <a:avLst/>
+          </a:prstGeom>
+          <a:noFill/>
+        </p:spPr>
+        <p:txBody>
+          <a:bodyPr wrap="square">
+            <a:spAutoFit/>
+          </a:bodyPr>
+          <a:lstStyle/>
+          <a:p>
+            <a:r>
+              <a:rPr lang="en-US" sz="1400" dirty="0">
+                <a:latin typeface="Arial Nova Light" panose="020B0304020202020204" pitchFamily="34" charset="0"/>
+              </a:rPr>
+              <a:t>The requirement does not specify a certain solution. It may be difficult in projects where a solution was already developed.</a:t>
+            </a:r>
+            <a:endParaRPr lang="es-ES" sz="1400" dirty="0">
+              <a:latin typeface="Arial Nova Light" panose="020B0304020202020204" pitchFamily="34" charset="0"/>
+            </a:endParaRPr>
+          </a:p>
+        </p:txBody>
+      </p:sp>
+      <p:sp>
+        <p:nvSpPr>
+          <p:cNvPr id="14" name="CuadroTexto 13">
+            <a:extLst>
+              <a:ext uri="{FF2B5EF4-FFF2-40B4-BE49-F238E27FC236}">
+                <a16:creationId xmlns:a16="http://schemas.microsoft.com/office/drawing/2014/main" id="{32926CD8-475E-4141-87DD-A170ABEF726C}"/>
+              </a:ext>
+            </a:extLst>
+          </p:cNvPr>
+          <p:cNvSpPr txBox="1"/>
+          <p:nvPr/>
+        </p:nvSpPr>
+        <p:spPr>
+          <a:xfrm>
+            <a:off x="3253154" y="5628961"/>
+            <a:ext cx="5099538" cy="307777"/>
+          </a:xfrm>
+          <a:prstGeom prst="rect">
+            <a:avLst/>
+          </a:prstGeom>
+          <a:noFill/>
+        </p:spPr>
+        <p:txBody>
+          <a:bodyPr wrap="square">
+            <a:spAutoFit/>
+          </a:bodyPr>
+          <a:lstStyle/>
+          <a:p>
+            <a:r>
+              <a:rPr lang="en-US" sz="1400" dirty="0">
+                <a:latin typeface="Arial Nova Light" panose="020B0304020202020204" pitchFamily="34" charset="0"/>
+              </a:rPr>
+              <a:t>It contains all the information to understand it.</a:t>
+            </a:r>
+            <a:endParaRPr lang="es-ES" sz="1400" dirty="0">
+              <a:latin typeface="Arial Nova Light" panose="020B0304020202020204" pitchFamily="34" charset="0"/>
+            </a:endParaRPr>
+          </a:p>
+        </p:txBody>
+      </p:sp>
       <p:graphicFrame>
         <p:nvGraphicFramePr>
-          <p:cNvPr id="6" name="Marcador de contenido 5"/>
+          <p:cNvPr id="15" name="Marcador de contenido 5">
+            <a:extLst>
+              <a:ext uri="{FF2B5EF4-FFF2-40B4-BE49-F238E27FC236}">
+                <a16:creationId xmlns:a16="http://schemas.microsoft.com/office/drawing/2014/main" id="{FFA932A1-5130-486B-9BBD-5CA9F862444F}"/>
+              </a:ext>
+            </a:extLst>
+          </p:cNvPr>
           <p:cNvGraphicFramePr>
             <a:graphicFrameLocks noGrp="1"/>
           </p:cNvGraphicFramePr>
@@ -23395,7 +23469,7 @@
             <p:ph sz="quarter" idx="13"/>
             <p:extLst>
               <p:ext uri="{D42A27DB-BD31-4B8C-83A1-F6EECF244321}">
-                <p14:modId xmlns:p14="http://schemas.microsoft.com/office/powerpoint/2010/main" val="469689430"/>
+                <p14:modId xmlns:p14="http://schemas.microsoft.com/office/powerpoint/2010/main" val="1828946249"/>
               </p:ext>
             </p:extLst>
           </p:nvPr>
@@ -23410,336 +23484,10 @@
           </a:graphicData>
         </a:graphic>
       </p:graphicFrame>
-      <p:sp>
-        <p:nvSpPr>
-          <p:cNvPr id="8" name="CuadroTexto 7">
-            <a:extLst>
-              <a:ext uri="{FF2B5EF4-FFF2-40B4-BE49-F238E27FC236}">
-                <a16:creationId xmlns:a16="http://schemas.microsoft.com/office/drawing/2014/main" id="{8225E371-0101-4B14-AD63-1E3286C26483}"/>
-              </a:ext>
-            </a:extLst>
-          </p:cNvPr>
-          <p:cNvSpPr txBox="1"/>
-          <p:nvPr/>
-        </p:nvSpPr>
-        <p:spPr>
-          <a:xfrm>
-            <a:off x="3253154" y="1380364"/>
-            <a:ext cx="5099538" cy="307777"/>
-          </a:xfrm>
-          <a:prstGeom prst="rect">
-            <a:avLst/>
-          </a:prstGeom>
-          <a:noFill/>
-        </p:spPr>
-        <p:txBody>
-          <a:bodyPr wrap="square">
-            <a:spAutoFit/>
-          </a:bodyPr>
-          <a:lstStyle/>
-          <a:p>
-            <a:r>
-              <a:rPr lang="en-US" sz="1400" dirty="0">
-                <a:latin typeface="Arial Nova Light" panose="020B0304020202020204" pitchFamily="34" charset="0"/>
-              </a:rPr>
-              <a:t>T</a:t>
-            </a:r>
-            <a:r>
-              <a:rPr lang="en-US" sz="1400" b="0" i="0" u="none" strike="noStrike" baseline="0" dirty="0">
-                <a:latin typeface="Arial Nova Light" panose="020B0304020202020204" pitchFamily="34" charset="0"/>
-              </a:rPr>
-              <a:t>echnically possible (cost and schedule).</a:t>
-            </a:r>
-            <a:endParaRPr lang="es-ES" sz="1400" dirty="0">
-              <a:latin typeface="Arial Nova Light" panose="020B0304020202020204" pitchFamily="34" charset="0"/>
-            </a:endParaRPr>
-          </a:p>
-        </p:txBody>
-      </p:sp>
-      <p:sp>
-        <p:nvSpPr>
-          <p:cNvPr id="9" name="CuadroTexto 8">
-            <a:extLst>
-              <a:ext uri="{FF2B5EF4-FFF2-40B4-BE49-F238E27FC236}">
-                <a16:creationId xmlns:a16="http://schemas.microsoft.com/office/drawing/2014/main" id="{D1D369E9-D6BD-4D20-86FA-91A6EF79AA01}"/>
-              </a:ext>
-            </a:extLst>
-          </p:cNvPr>
-          <p:cNvSpPr txBox="1"/>
-          <p:nvPr/>
-        </p:nvSpPr>
-        <p:spPr>
-          <a:xfrm>
-            <a:off x="3253154" y="1896725"/>
-            <a:ext cx="5099538" cy="523220"/>
-          </a:xfrm>
-          <a:prstGeom prst="rect">
-            <a:avLst/>
-          </a:prstGeom>
-          <a:noFill/>
-        </p:spPr>
-        <p:txBody>
-          <a:bodyPr wrap="square">
-            <a:spAutoFit/>
-          </a:bodyPr>
-          <a:lstStyle/>
-          <a:p>
-            <a:r>
-              <a:rPr lang="en-US" sz="1400" dirty="0">
-                <a:latin typeface="Arial Nova Light" panose="020B0304020202020204" pitchFamily="34" charset="0"/>
-              </a:rPr>
-              <a:t>Each statement can be tested. There is a feasible procedure to do so.</a:t>
-            </a:r>
-            <a:endParaRPr lang="es-ES" sz="1400" dirty="0">
-              <a:latin typeface="Arial Nova Light" panose="020B0304020202020204" pitchFamily="34" charset="0"/>
-            </a:endParaRPr>
-          </a:p>
-        </p:txBody>
-      </p:sp>
-      <p:sp>
-        <p:nvSpPr>
-          <p:cNvPr id="10" name="CuadroTexto 9">
-            <a:extLst>
-              <a:ext uri="{FF2B5EF4-FFF2-40B4-BE49-F238E27FC236}">
-                <a16:creationId xmlns:a16="http://schemas.microsoft.com/office/drawing/2014/main" id="{7D9F30C6-9E16-4CB0-B7B4-2F41CEA20EDF}"/>
-              </a:ext>
-            </a:extLst>
-          </p:cNvPr>
-          <p:cNvSpPr txBox="1"/>
-          <p:nvPr/>
-        </p:nvSpPr>
-        <p:spPr>
-          <a:xfrm>
-            <a:off x="3253154" y="2607229"/>
-            <a:ext cx="5890846" cy="523220"/>
-          </a:xfrm>
-          <a:prstGeom prst="rect">
-            <a:avLst/>
-          </a:prstGeom>
-          <a:noFill/>
-        </p:spPr>
-        <p:txBody>
-          <a:bodyPr wrap="square">
-            <a:spAutoFit/>
-          </a:bodyPr>
-          <a:lstStyle/>
-          <a:p>
-            <a:r>
-              <a:rPr lang="en-US" sz="1400" dirty="0">
-                <a:latin typeface="Arial Nova Light" panose="020B0304020202020204" pitchFamily="34" charset="0"/>
-              </a:rPr>
-              <a:t>Each statement is precise, there are no ambiguities. There is only one interpretation.</a:t>
-            </a:r>
-            <a:endParaRPr lang="es-ES" sz="1400" dirty="0">
-              <a:latin typeface="Arial Nova Light" panose="020B0304020202020204" pitchFamily="34" charset="0"/>
-            </a:endParaRPr>
-          </a:p>
-        </p:txBody>
-      </p:sp>
-      <p:sp>
-        <p:nvSpPr>
-          <p:cNvPr id="11" name="CuadroTexto 10">
-            <a:extLst>
-              <a:ext uri="{FF2B5EF4-FFF2-40B4-BE49-F238E27FC236}">
-                <a16:creationId xmlns:a16="http://schemas.microsoft.com/office/drawing/2014/main" id="{91E83EEB-C537-4099-BFA5-FE9D9BA5F4A0}"/>
-              </a:ext>
-            </a:extLst>
-          </p:cNvPr>
-          <p:cNvSpPr txBox="1"/>
-          <p:nvPr/>
-        </p:nvSpPr>
-        <p:spPr>
-          <a:xfrm>
-            <a:off x="3253154" y="3132222"/>
-            <a:ext cx="5099538" cy="523220"/>
-          </a:xfrm>
-          <a:prstGeom prst="rect">
-            <a:avLst/>
-          </a:prstGeom>
-          <a:noFill/>
-        </p:spPr>
-        <p:txBody>
-          <a:bodyPr wrap="square">
-            <a:spAutoFit/>
-          </a:bodyPr>
-          <a:lstStyle/>
-          <a:p>
-            <a:r>
-              <a:rPr lang="en-US" sz="1400" dirty="0">
-                <a:latin typeface="Arial Nova Light" panose="020B0304020202020204" pitchFamily="34" charset="0"/>
-              </a:rPr>
-              <a:t>Each statement can be understood. There are not spelling or other kind of mistakes.</a:t>
-            </a:r>
-            <a:endParaRPr lang="es-ES" sz="1400" dirty="0">
-              <a:latin typeface="Arial Nova Light" panose="020B0304020202020204" pitchFamily="34" charset="0"/>
-            </a:endParaRPr>
-          </a:p>
-        </p:txBody>
-      </p:sp>
-      <p:sp>
-        <p:nvSpPr>
-          <p:cNvPr id="12" name="CuadroTexto 11">
-            <a:extLst>
-              <a:ext uri="{FF2B5EF4-FFF2-40B4-BE49-F238E27FC236}">
-                <a16:creationId xmlns:a16="http://schemas.microsoft.com/office/drawing/2014/main" id="{7DE0CD39-C40C-4551-8B0F-3DA045181A52}"/>
-              </a:ext>
-            </a:extLst>
-          </p:cNvPr>
-          <p:cNvSpPr txBox="1"/>
-          <p:nvPr/>
-        </p:nvSpPr>
-        <p:spPr>
-          <a:xfrm>
-            <a:off x="3253154" y="3855883"/>
-            <a:ext cx="5099538" cy="307777"/>
-          </a:xfrm>
-          <a:prstGeom prst="rect">
-            <a:avLst/>
-          </a:prstGeom>
-          <a:noFill/>
-        </p:spPr>
-        <p:txBody>
-          <a:bodyPr wrap="square">
-            <a:spAutoFit/>
-          </a:bodyPr>
-          <a:lstStyle/>
-          <a:p>
-            <a:r>
-              <a:rPr lang="en-US" sz="1400" dirty="0">
-                <a:latin typeface="Arial Nova Light" panose="020B0304020202020204" pitchFamily="34" charset="0"/>
-              </a:rPr>
-              <a:t>The requirement defines a single traceable element.</a:t>
-            </a:r>
-            <a:endParaRPr lang="es-ES" sz="1400" dirty="0">
-              <a:latin typeface="Arial Nova Light" panose="020B0304020202020204" pitchFamily="34" charset="0"/>
-            </a:endParaRPr>
-          </a:p>
-        </p:txBody>
-      </p:sp>
-      <p:sp>
-        <p:nvSpPr>
-          <p:cNvPr id="13" name="CuadroTexto 12">
-            <a:extLst>
-              <a:ext uri="{FF2B5EF4-FFF2-40B4-BE49-F238E27FC236}">
-                <a16:creationId xmlns:a16="http://schemas.microsoft.com/office/drawing/2014/main" id="{79F4D517-B622-460F-A2F1-E162FAE4DD5A}"/>
-              </a:ext>
-            </a:extLst>
-          </p:cNvPr>
-          <p:cNvSpPr txBox="1"/>
-          <p:nvPr/>
-        </p:nvSpPr>
-        <p:spPr>
-          <a:xfrm>
-            <a:off x="3253154" y="4442430"/>
-            <a:ext cx="5099538" cy="307777"/>
-          </a:xfrm>
-          <a:prstGeom prst="rect">
-            <a:avLst/>
-          </a:prstGeom>
-          <a:noFill/>
-        </p:spPr>
-        <p:txBody>
-          <a:bodyPr wrap="square">
-            <a:spAutoFit/>
-          </a:bodyPr>
-          <a:lstStyle/>
-          <a:p>
-            <a:r>
-              <a:rPr lang="en-US" sz="1400" dirty="0">
-                <a:latin typeface="Arial Nova Light" panose="020B0304020202020204" pitchFamily="34" charset="0"/>
-              </a:rPr>
-              <a:t>Does not make you break any law.</a:t>
-            </a:r>
-            <a:endParaRPr lang="es-ES" sz="1400" dirty="0">
-              <a:latin typeface="Arial Nova Light" panose="020B0304020202020204" pitchFamily="34" charset="0"/>
-            </a:endParaRPr>
-          </a:p>
-        </p:txBody>
-      </p:sp>
-      <p:sp>
-        <p:nvSpPr>
-          <p:cNvPr id="15" name="CuadroTexto 14">
-            <a:extLst>
-              <a:ext uri="{FF2B5EF4-FFF2-40B4-BE49-F238E27FC236}">
-                <a16:creationId xmlns:a16="http://schemas.microsoft.com/office/drawing/2014/main" id="{1D49D1F3-5309-492B-8A41-CEC19B9DF620}"/>
-              </a:ext>
-            </a:extLst>
-          </p:cNvPr>
-          <p:cNvSpPr txBox="1"/>
-          <p:nvPr/>
-        </p:nvSpPr>
-        <p:spPr>
-          <a:xfrm>
-            <a:off x="3253154" y="4954416"/>
-            <a:ext cx="5099538" cy="523220"/>
-          </a:xfrm>
-          <a:prstGeom prst="rect">
-            <a:avLst/>
-          </a:prstGeom>
-          <a:noFill/>
-        </p:spPr>
-        <p:txBody>
-          <a:bodyPr wrap="square">
-            <a:spAutoFit/>
-          </a:bodyPr>
-          <a:lstStyle/>
-          <a:p>
-            <a:r>
-              <a:rPr lang="en-US" sz="1400" dirty="0">
-                <a:latin typeface="Arial Nova Light" panose="020B0304020202020204" pitchFamily="34" charset="0"/>
-              </a:rPr>
-              <a:t>The requirement does not specify a certain solution. It may be difficult in projects where a solution was already developed.</a:t>
-            </a:r>
-            <a:endParaRPr lang="es-ES" sz="1400" dirty="0">
-              <a:latin typeface="Arial Nova Light" panose="020B0304020202020204" pitchFamily="34" charset="0"/>
-            </a:endParaRPr>
-          </a:p>
-        </p:txBody>
-      </p:sp>
-      <p:sp>
-        <p:nvSpPr>
-          <p:cNvPr id="16" name="CuadroTexto 15">
-            <a:extLst>
-              <a:ext uri="{FF2B5EF4-FFF2-40B4-BE49-F238E27FC236}">
-                <a16:creationId xmlns:a16="http://schemas.microsoft.com/office/drawing/2014/main" id="{3C693037-B6F0-461A-ABC2-190164FEB67C}"/>
-              </a:ext>
-            </a:extLst>
-          </p:cNvPr>
-          <p:cNvSpPr txBox="1"/>
-          <p:nvPr/>
-        </p:nvSpPr>
-        <p:spPr>
-          <a:xfrm>
-            <a:off x="3253154" y="5628961"/>
-            <a:ext cx="5099538" cy="307777"/>
-          </a:xfrm>
-          <a:prstGeom prst="rect">
-            <a:avLst/>
-          </a:prstGeom>
-          <a:noFill/>
-        </p:spPr>
-        <p:txBody>
-          <a:bodyPr wrap="square">
-            <a:spAutoFit/>
-          </a:bodyPr>
-          <a:lstStyle/>
-          <a:p>
-            <a:r>
-              <a:rPr lang="en-US" sz="1400" dirty="0">
-                <a:latin typeface="Arial Nova Light" panose="020B0304020202020204" pitchFamily="34" charset="0"/>
-              </a:rPr>
-              <a:t>It contains all the information to understand it.</a:t>
-            </a:r>
-            <a:endParaRPr lang="es-ES" sz="1400" dirty="0">
-              <a:latin typeface="Arial Nova Light" panose="020B0304020202020204" pitchFamily="34" charset="0"/>
-            </a:endParaRPr>
-          </a:p>
-        </p:txBody>
-      </p:sp>
     </p:spTree>
     <p:extLst>
       <p:ext uri="{BB962C8B-B14F-4D97-AF65-F5344CB8AC3E}">
-        <p14:creationId xmlns:p14="http://schemas.microsoft.com/office/powerpoint/2010/main" val="2187255896"/>
+        <p14:creationId xmlns:p14="http://schemas.microsoft.com/office/powerpoint/2010/main" val="309089300"/>
       </p:ext>
     </p:extLst>
   </p:cSld>
@@ -23790,7 +23538,7 @@
             <a:fld id="{2D72A43D-7419-4C41-A920-C6E38643746D}" type="datetime3">
               <a:rPr lang="es-ES_tradnl" smtClean="0"/>
               <a:pPr/>
-              <a:t>02.01.23</a:t>
+              <a:t>14.02.23</a:t>
             </a:fld>
             <a:endParaRPr lang="en-US" dirty="0"/>
           </a:p>
@@ -23819,7 +23567,7 @@
           <a:p>
             <a:r>
               <a:rPr lang="en-US" dirty="0"/>
-              <a:t>Requirements</a:t>
+              <a:t>Writing requirements</a:t>
             </a:r>
           </a:p>
         </p:txBody>
@@ -24190,46 +23938,6 @@
       </p:pic>
       <p:sp>
         <p:nvSpPr>
-          <p:cNvPr id="15" name="CuadroTexto 14">
-            <a:extLst>
-              <a:ext uri="{FF2B5EF4-FFF2-40B4-BE49-F238E27FC236}">
-                <a16:creationId xmlns:a16="http://schemas.microsoft.com/office/drawing/2014/main" id="{3FA48D20-1697-4D42-B6BE-F4E2AD269E5A}"/>
-              </a:ext>
-            </a:extLst>
-          </p:cNvPr>
-          <p:cNvSpPr txBox="1"/>
-          <p:nvPr/>
-        </p:nvSpPr>
-        <p:spPr>
-          <a:xfrm>
-            <a:off x="1378253" y="4795596"/>
-            <a:ext cx="4281854" cy="646331"/>
-          </a:xfrm>
-          <a:prstGeom prst="rect">
-            <a:avLst/>
-          </a:prstGeom>
-          <a:noFill/>
-        </p:spPr>
-        <p:txBody>
-          <a:bodyPr wrap="square">
-            <a:spAutoFit/>
-          </a:bodyPr>
-          <a:lstStyle/>
-          <a:p>
-            <a:r>
-              <a:rPr lang="en-US" dirty="0">
-                <a:latin typeface="Arial Nova Light" panose="020B0304020202020204" pitchFamily="34" charset="0"/>
-              </a:rPr>
-              <a:t>The system shall give full power up to 2000 rpm. </a:t>
-            </a:r>
-            <a:endParaRPr lang="es-ES" i="1" dirty="0">
-              <a:latin typeface="Arial Nova Light" panose="020B0304020202020204" pitchFamily="34" charset="0"/>
-            </a:endParaRPr>
-          </a:p>
-        </p:txBody>
-      </p:sp>
-      <p:sp>
-        <p:nvSpPr>
           <p:cNvPr id="16" name="Rectángulo 15">
             <a:extLst>
               <a:ext uri="{FF2B5EF4-FFF2-40B4-BE49-F238E27FC236}">
@@ -24384,7 +24092,7 @@
             <a:fld id="{2D72A43D-7419-4C41-A920-C6E38643746D}" type="datetime3">
               <a:rPr lang="es-ES_tradnl" smtClean="0"/>
               <a:pPr/>
-              <a:t>02.01.23</a:t>
+              <a:t>14.02.23</a:t>
             </a:fld>
             <a:endParaRPr lang="en-US" dirty="0"/>
           </a:p>
@@ -24413,7 +24121,7 @@
           <a:p>
             <a:r>
               <a:rPr lang="en-US" dirty="0"/>
-              <a:t>Requirements</a:t>
+              <a:t>Writing requirements</a:t>
             </a:r>
           </a:p>
         </p:txBody>
@@ -24779,46 +24487,6 @@
           </a:prstGeom>
         </p:spPr>
       </p:pic>
-      <p:sp>
-        <p:nvSpPr>
-          <p:cNvPr id="19" name="CuadroTexto 18">
-            <a:extLst>
-              <a:ext uri="{FF2B5EF4-FFF2-40B4-BE49-F238E27FC236}">
-                <a16:creationId xmlns:a16="http://schemas.microsoft.com/office/drawing/2014/main" id="{24F12F2C-3C6E-46F4-8A01-B9BE7AF49CB0}"/>
-              </a:ext>
-            </a:extLst>
-          </p:cNvPr>
-          <p:cNvSpPr txBox="1"/>
-          <p:nvPr/>
-        </p:nvSpPr>
-        <p:spPr>
-          <a:xfrm>
-            <a:off x="1327639" y="4498399"/>
-            <a:ext cx="4281854" cy="1200329"/>
-          </a:xfrm>
-          <a:prstGeom prst="rect">
-            <a:avLst/>
-          </a:prstGeom>
-          <a:noFill/>
-        </p:spPr>
-        <p:txBody>
-          <a:bodyPr wrap="square">
-            <a:spAutoFit/>
-          </a:bodyPr>
-          <a:lstStyle/>
-          <a:p>
-            <a:r>
-              <a:rPr lang="en-US" dirty="0">
-                <a:latin typeface="Arial Nova Light" panose="020B0304020202020204" pitchFamily="34" charset="0"/>
-              </a:rPr>
-              <a:t>The output of the program shall be given within 20 s of event X, 60% of the time; and shall be given within 30 s of event X, 100% of the time. </a:t>
-            </a:r>
-            <a:endParaRPr lang="es-ES" i="1" dirty="0">
-              <a:latin typeface="Arial Nova Light" panose="020B0304020202020204" pitchFamily="34" charset="0"/>
-            </a:endParaRPr>
-          </a:p>
-        </p:txBody>
-      </p:sp>
       <p:sp>
         <p:nvSpPr>
           <p:cNvPr id="20" name="Rectángulo 19">

</xml_diff>